<commit_message>
all-slides.pdf code.zip control.pdf control.pptx
</commit_message>
<xml_diff>
--- a/ipsa/slides/control.pptx
+++ b/ipsa/slides/control.pptx
@@ -5,7 +5,7 @@
     <p:sldMasterId id="2147483648" r:id="rId1"/>
   </p:sldMasterIdLst>
   <p:notesMasterIdLst>
-    <p:notesMasterId r:id="rId17"/>
+    <p:notesMasterId r:id="rId18"/>
   </p:notesMasterIdLst>
   <p:sldIdLst>
     <p:sldId id="370" r:id="rId2"/>
@@ -22,7 +22,8 @@
     <p:sldId id="385" r:id="rId13"/>
     <p:sldId id="388" r:id="rId14"/>
     <p:sldId id="386" r:id="rId15"/>
-    <p:sldId id="387" r:id="rId16"/>
+    <p:sldId id="391" r:id="rId16"/>
+    <p:sldId id="387" r:id="rId17"/>
   </p:sldIdLst>
   <p:sldSz cx="12192000" cy="6858000"/>
   <p:notesSz cx="6858000" cy="9144000"/>
@@ -132,13 +133,165 @@
 <file path=ppt/revisionInfo.xml><?xml version="1.0" encoding="utf-8"?>
 <p1510:revInfo xmlns:a="http://schemas.openxmlformats.org/drawingml/2006/main" xmlns:r="http://schemas.openxmlformats.org/officeDocument/2006/relationships" xmlns:p1510="http://schemas.microsoft.com/office/powerpoint/2015/10/main">
   <p1510:revLst>
-    <p1510:client id="{DDB2EBFE-BE9D-478D-B155-AD8F8F2B5AB2}" v="20" dt="2024-02-05T08:03:33.637"/>
+    <p1510:client id="{5A202A9A-287B-44F3-8939-D04FF8059D66}" v="74" dt="2024-12-18T12:19:05.196"/>
   </p1510:revLst>
 </p1510:revInfo>
 </file>
 
 <file path=ppt/changesInfos/changesInfo1.xml><?xml version="1.0" encoding="utf-8"?>
 <pc:chgInfo xmlns:a="http://schemas.openxmlformats.org/drawingml/2006/main" xmlns:r="http://schemas.openxmlformats.org/officeDocument/2006/relationships" xmlns:ac="http://schemas.microsoft.com/office/drawing/2013/main/command" xmlns:pc="http://schemas.microsoft.com/office/powerpoint/2013/main/command">
+  <pc:docChgLst>
+    <pc:chgData name="Gerth Stølting Brodal" userId="04ef4784-6591-4f86-a140-f5c3b108582a" providerId="ADAL" clId="{5A202A9A-287B-44F3-8939-D04FF8059D66}"/>
+    <pc:docChg chg="undo custSel addSld modSld">
+      <pc:chgData name="Gerth Stølting Brodal" userId="04ef4784-6591-4f86-a140-f5c3b108582a" providerId="ADAL" clId="{5A202A9A-287B-44F3-8939-D04FF8059D66}" dt="2024-12-18T12:19:05.196" v="1107" actId="20577"/>
+      <pc:docMkLst>
+        <pc:docMk/>
+      </pc:docMkLst>
+      <pc:sldChg chg="addSp delSp modSp new mod modAnim modNotesTx">
+        <pc:chgData name="Gerth Stølting Brodal" userId="04ef4784-6591-4f86-a140-f5c3b108582a" providerId="ADAL" clId="{5A202A9A-287B-44F3-8939-D04FF8059D66}" dt="2024-12-18T12:19:05.196" v="1107" actId="20577"/>
+        <pc:sldMkLst>
+          <pc:docMk/>
+          <pc:sldMk cId="2077438254" sldId="391"/>
+        </pc:sldMkLst>
+        <pc:spChg chg="mod">
+          <ac:chgData name="Gerth Stølting Brodal" userId="04ef4784-6591-4f86-a140-f5c3b108582a" providerId="ADAL" clId="{5A202A9A-287B-44F3-8939-D04FF8059D66}" dt="2024-12-18T10:37:03.340" v="682" actId="1076"/>
+          <ac:spMkLst>
+            <pc:docMk/>
+            <pc:sldMk cId="2077438254" sldId="391"/>
+            <ac:spMk id="2" creationId="{5C6EB888-E169-9745-52B4-AD4A7CA428B9}"/>
+          </ac:spMkLst>
+        </pc:spChg>
+        <pc:spChg chg="mod">
+          <ac:chgData name="Gerth Stølting Brodal" userId="04ef4784-6591-4f86-a140-f5c3b108582a" providerId="ADAL" clId="{5A202A9A-287B-44F3-8939-D04FF8059D66}" dt="2024-12-18T12:19:05.196" v="1107" actId="20577"/>
+          <ac:spMkLst>
+            <pc:docMk/>
+            <pc:sldMk cId="2077438254" sldId="391"/>
+            <ac:spMk id="3" creationId="{5FB15087-8789-1E86-2833-C8282CE6B5C3}"/>
+          </ac:spMkLst>
+        </pc:spChg>
+        <pc:spChg chg="add del">
+          <ac:chgData name="Gerth Stølting Brodal" userId="04ef4784-6591-4f86-a140-f5c3b108582a" providerId="ADAL" clId="{5A202A9A-287B-44F3-8939-D04FF8059D66}" dt="2024-12-18T09:50:06.799" v="46" actId="22"/>
+          <ac:spMkLst>
+            <pc:docMk/>
+            <pc:sldMk cId="2077438254" sldId="391"/>
+            <ac:spMk id="5" creationId="{4078411E-7EB8-3EBE-A75F-F84C69775554}"/>
+          </ac:spMkLst>
+        </pc:spChg>
+        <pc:spChg chg="add del">
+          <ac:chgData name="Gerth Stølting Brodal" userId="04ef4784-6591-4f86-a140-f5c3b108582a" providerId="ADAL" clId="{5A202A9A-287B-44F3-8939-D04FF8059D66}" dt="2024-12-18T09:50:12.552" v="48" actId="22"/>
+          <ac:spMkLst>
+            <pc:docMk/>
+            <pc:sldMk cId="2077438254" sldId="391"/>
+            <ac:spMk id="7" creationId="{A10005A3-F78B-E48F-76CC-32F9F7E61750}"/>
+          </ac:spMkLst>
+        </pc:spChg>
+        <pc:spChg chg="add del">
+          <ac:chgData name="Gerth Stølting Brodal" userId="04ef4784-6591-4f86-a140-f5c3b108582a" providerId="ADAL" clId="{5A202A9A-287B-44F3-8939-D04FF8059D66}" dt="2024-12-18T10:00:31.344" v="52" actId="22"/>
+          <ac:spMkLst>
+            <pc:docMk/>
+            <pc:sldMk cId="2077438254" sldId="391"/>
+            <ac:spMk id="10" creationId="{1FFE8BE3-2FBA-9DDA-35D9-6F14F88BAEA3}"/>
+          </ac:spMkLst>
+        </pc:spChg>
+        <pc:spChg chg="add mod">
+          <ac:chgData name="Gerth Stølting Brodal" userId="04ef4784-6591-4f86-a140-f5c3b108582a" providerId="ADAL" clId="{5A202A9A-287B-44F3-8939-D04FF8059D66}" dt="2024-12-18T10:16:07.992" v="455" actId="1037"/>
+          <ac:spMkLst>
+            <pc:docMk/>
+            <pc:sldMk cId="2077438254" sldId="391"/>
+            <ac:spMk id="16" creationId="{B8A4B65A-06D7-11D9-1B7D-08BC26E2352F}"/>
+          </ac:spMkLst>
+        </pc:spChg>
+        <pc:spChg chg="add mod">
+          <ac:chgData name="Gerth Stølting Brodal" userId="04ef4784-6591-4f86-a140-f5c3b108582a" providerId="ADAL" clId="{5A202A9A-287B-44F3-8939-D04FF8059D66}" dt="2024-12-18T10:16:07.992" v="455" actId="1037"/>
+          <ac:spMkLst>
+            <pc:docMk/>
+            <pc:sldMk cId="2077438254" sldId="391"/>
+            <ac:spMk id="18" creationId="{7C55346A-44F9-5112-9FB0-154AD01DE983}"/>
+          </ac:spMkLst>
+        </pc:spChg>
+        <pc:spChg chg="add mod">
+          <ac:chgData name="Gerth Stølting Brodal" userId="04ef4784-6591-4f86-a140-f5c3b108582a" providerId="ADAL" clId="{5A202A9A-287B-44F3-8939-D04FF8059D66}" dt="2024-12-18T10:16:07.992" v="455" actId="1037"/>
+          <ac:spMkLst>
+            <pc:docMk/>
+            <pc:sldMk cId="2077438254" sldId="391"/>
+            <ac:spMk id="20" creationId="{E9240245-F323-65AC-AC86-6ABC0D8422D1}"/>
+          </ac:spMkLst>
+        </pc:spChg>
+        <pc:spChg chg="add del mod">
+          <ac:chgData name="Gerth Stølting Brodal" userId="04ef4784-6591-4f86-a140-f5c3b108582a" providerId="ADAL" clId="{5A202A9A-287B-44F3-8939-D04FF8059D66}" dt="2024-12-18T10:14:37.781" v="357"/>
+          <ac:spMkLst>
+            <pc:docMk/>
+            <pc:sldMk cId="2077438254" sldId="391"/>
+            <ac:spMk id="22" creationId="{080BE306-A0CA-F0C5-5BEB-35E207745AEF}"/>
+          </ac:spMkLst>
+        </pc:spChg>
+        <pc:graphicFrameChg chg="add del mod">
+          <ac:chgData name="Gerth Stølting Brodal" userId="04ef4784-6591-4f86-a140-f5c3b108582a" providerId="ADAL" clId="{5A202A9A-287B-44F3-8939-D04FF8059D66}" dt="2024-12-18T10:03:52.120" v="60" actId="478"/>
+          <ac:graphicFrameMkLst>
+            <pc:docMk/>
+            <pc:sldMk cId="2077438254" sldId="391"/>
+            <ac:graphicFrameMk id="8" creationId="{34443A8D-BD34-EE6B-EC7B-F183B4047FC9}"/>
+          </ac:graphicFrameMkLst>
+        </pc:graphicFrameChg>
+        <pc:graphicFrameChg chg="add mod modGraphic">
+          <ac:chgData name="Gerth Stølting Brodal" userId="04ef4784-6591-4f86-a140-f5c3b108582a" providerId="ADAL" clId="{5A202A9A-287B-44F3-8939-D04FF8059D66}" dt="2024-12-18T12:18:15.192" v="1105" actId="1076"/>
+          <ac:graphicFrameMkLst>
+            <pc:docMk/>
+            <pc:sldMk cId="2077438254" sldId="391"/>
+            <ac:graphicFrameMk id="11" creationId="{02F531C8-5154-8ABB-8F78-8E20CC705335}"/>
+          </ac:graphicFrameMkLst>
+        </pc:graphicFrameChg>
+        <pc:graphicFrameChg chg="add mod modGraphic">
+          <ac:chgData name="Gerth Stølting Brodal" userId="04ef4784-6591-4f86-a140-f5c3b108582a" providerId="ADAL" clId="{5A202A9A-287B-44F3-8939-D04FF8059D66}" dt="2024-12-18T10:16:07.992" v="455" actId="1037"/>
+          <ac:graphicFrameMkLst>
+            <pc:docMk/>
+            <pc:sldMk cId="2077438254" sldId="391"/>
+            <ac:graphicFrameMk id="12" creationId="{49CAE249-0CFD-66AD-BC65-DF4033B6C043}"/>
+          </ac:graphicFrameMkLst>
+        </pc:graphicFrameChg>
+        <pc:cxnChg chg="add mod">
+          <ac:chgData name="Gerth Stølting Brodal" userId="04ef4784-6591-4f86-a140-f5c3b108582a" providerId="ADAL" clId="{5A202A9A-287B-44F3-8939-D04FF8059D66}" dt="2024-12-18T10:16:07.992" v="455" actId="1037"/>
+          <ac:cxnSpMkLst>
+            <pc:docMk/>
+            <pc:sldMk cId="2077438254" sldId="391"/>
+            <ac:cxnSpMk id="13" creationId="{97508C72-EE9D-4F7B-EE7A-E2EE4DA95A02}"/>
+          </ac:cxnSpMkLst>
+        </pc:cxnChg>
+        <pc:cxnChg chg="add mod">
+          <ac:chgData name="Gerth Stølting Brodal" userId="04ef4784-6591-4f86-a140-f5c3b108582a" providerId="ADAL" clId="{5A202A9A-287B-44F3-8939-D04FF8059D66}" dt="2024-12-18T10:17:03.185" v="476" actId="1038"/>
+          <ac:cxnSpMkLst>
+            <pc:docMk/>
+            <pc:sldMk cId="2077438254" sldId="391"/>
+            <ac:cxnSpMk id="17" creationId="{87A7AE90-EA3B-A87C-0BB3-AEE4A06077F9}"/>
+          </ac:cxnSpMkLst>
+        </pc:cxnChg>
+        <pc:cxnChg chg="add del mod">
+          <ac:chgData name="Gerth Stølting Brodal" userId="04ef4784-6591-4f86-a140-f5c3b108582a" providerId="ADAL" clId="{5A202A9A-287B-44F3-8939-D04FF8059D66}" dt="2024-12-18T10:13:55.628" v="327" actId="478"/>
+          <ac:cxnSpMkLst>
+            <pc:docMk/>
+            <pc:sldMk cId="2077438254" sldId="391"/>
+            <ac:cxnSpMk id="19" creationId="{BF3FDE3F-E802-A55A-FB1C-4B6470676F35}"/>
+          </ac:cxnSpMkLst>
+        </pc:cxnChg>
+        <pc:cxnChg chg="add del mod">
+          <ac:chgData name="Gerth Stølting Brodal" userId="04ef4784-6591-4f86-a140-f5c3b108582a" providerId="ADAL" clId="{5A202A9A-287B-44F3-8939-D04FF8059D66}" dt="2024-12-18T10:13:52.235" v="326" actId="478"/>
+          <ac:cxnSpMkLst>
+            <pc:docMk/>
+            <pc:sldMk cId="2077438254" sldId="391"/>
+            <ac:cxnSpMk id="21" creationId="{F73B2160-9FFE-FDDE-99AB-87D14440282E}"/>
+          </ac:cxnSpMkLst>
+        </pc:cxnChg>
+        <pc:cxnChg chg="add mod">
+          <ac:chgData name="Gerth Stølting Brodal" userId="04ef4784-6591-4f86-a140-f5c3b108582a" providerId="ADAL" clId="{5A202A9A-287B-44F3-8939-D04FF8059D66}" dt="2024-12-18T10:16:07.992" v="455" actId="1037"/>
+          <ac:cxnSpMkLst>
+            <pc:docMk/>
+            <pc:sldMk cId="2077438254" sldId="391"/>
+            <ac:cxnSpMk id="27" creationId="{CB8FBD1D-9C9D-9B7F-346A-48CEDA043D18}"/>
+          </ac:cxnSpMkLst>
+        </pc:cxnChg>
+      </pc:sldChg>
+    </pc:docChg>
+  </pc:docChgLst>
   <pc:docChgLst>
     <pc:chgData name="Gerth Stølting Brodal" userId="04ef4784-6591-4f86-a140-f5c3b108582a" providerId="ADAL" clId="{CCA6BA44-85D7-4E34-A506-D12B36546E3D}"/>
     <pc:docChg chg="modSld">
@@ -152,118 +305,6 @@
           <pc:docMk/>
           <pc:sldMk cId="328472895" sldId="380"/>
         </pc:sldMkLst>
-        <pc:spChg chg="mod">
-          <ac:chgData name="Gerth Stølting Brodal" userId="04ef4784-6591-4f86-a140-f5c3b108582a" providerId="ADAL" clId="{CCA6BA44-85D7-4E34-A506-D12B36546E3D}" dt="2023-02-06T06:50:16.540" v="46" actId="1037"/>
-          <ac:spMkLst>
-            <pc:docMk/>
-            <pc:sldMk cId="328472895" sldId="380"/>
-            <ac:spMk id="4" creationId="{00000000-0000-0000-0000-000000000000}"/>
-          </ac:spMkLst>
-        </pc:spChg>
-        <pc:spChg chg="mod">
-          <ac:chgData name="Gerth Stølting Brodal" userId="04ef4784-6591-4f86-a140-f5c3b108582a" providerId="ADAL" clId="{CCA6BA44-85D7-4E34-A506-D12B36546E3D}" dt="2023-02-06T06:50:16.540" v="46" actId="1037"/>
-          <ac:spMkLst>
-            <pc:docMk/>
-            <pc:sldMk cId="328472895" sldId="380"/>
-            <ac:spMk id="5" creationId="{00000000-0000-0000-0000-000000000000}"/>
-          </ac:spMkLst>
-        </pc:spChg>
-        <pc:spChg chg="mod">
-          <ac:chgData name="Gerth Stølting Brodal" userId="04ef4784-6591-4f86-a140-f5c3b108582a" providerId="ADAL" clId="{CCA6BA44-85D7-4E34-A506-D12B36546E3D}" dt="2023-02-06T06:50:16.540" v="46" actId="1037"/>
-          <ac:spMkLst>
-            <pc:docMk/>
-            <pc:sldMk cId="328472895" sldId="380"/>
-            <ac:spMk id="6" creationId="{00000000-0000-0000-0000-000000000000}"/>
-          </ac:spMkLst>
-        </pc:spChg>
-        <pc:spChg chg="mod">
-          <ac:chgData name="Gerth Stølting Brodal" userId="04ef4784-6591-4f86-a140-f5c3b108582a" providerId="ADAL" clId="{CCA6BA44-85D7-4E34-A506-D12B36546E3D}" dt="2023-02-06T06:50:16.540" v="46" actId="1037"/>
-          <ac:spMkLst>
-            <pc:docMk/>
-            <pc:sldMk cId="328472895" sldId="380"/>
-            <ac:spMk id="7" creationId="{00000000-0000-0000-0000-000000000000}"/>
-          </ac:spMkLst>
-        </pc:spChg>
-        <pc:spChg chg="mod">
-          <ac:chgData name="Gerth Stølting Brodal" userId="04ef4784-6591-4f86-a140-f5c3b108582a" providerId="ADAL" clId="{CCA6BA44-85D7-4E34-A506-D12B36546E3D}" dt="2023-02-06T06:50:16.540" v="46" actId="1037"/>
-          <ac:spMkLst>
-            <pc:docMk/>
-            <pc:sldMk cId="328472895" sldId="380"/>
-            <ac:spMk id="9" creationId="{00000000-0000-0000-0000-000000000000}"/>
-          </ac:spMkLst>
-        </pc:spChg>
-        <pc:spChg chg="mod">
-          <ac:chgData name="Gerth Stølting Brodal" userId="04ef4784-6591-4f86-a140-f5c3b108582a" providerId="ADAL" clId="{CCA6BA44-85D7-4E34-A506-D12B36546E3D}" dt="2023-02-06T06:50:16.540" v="46" actId="1037"/>
-          <ac:spMkLst>
-            <pc:docMk/>
-            <pc:sldMk cId="328472895" sldId="380"/>
-            <ac:spMk id="27" creationId="{00000000-0000-0000-0000-000000000000}"/>
-          </ac:spMkLst>
-        </pc:spChg>
-        <pc:spChg chg="mod">
-          <ac:chgData name="Gerth Stølting Brodal" userId="04ef4784-6591-4f86-a140-f5c3b108582a" providerId="ADAL" clId="{CCA6BA44-85D7-4E34-A506-D12B36546E3D}" dt="2023-02-06T06:50:16.540" v="46" actId="1037"/>
-          <ac:spMkLst>
-            <pc:docMk/>
-            <pc:sldMk cId="328472895" sldId="380"/>
-            <ac:spMk id="28" creationId="{00000000-0000-0000-0000-000000000000}"/>
-          </ac:spMkLst>
-        </pc:spChg>
-        <pc:spChg chg="mod">
-          <ac:chgData name="Gerth Stølting Brodal" userId="04ef4784-6591-4f86-a140-f5c3b108582a" providerId="ADAL" clId="{CCA6BA44-85D7-4E34-A506-D12B36546E3D}" dt="2023-02-06T06:50:16.540" v="46" actId="1037"/>
-          <ac:spMkLst>
-            <pc:docMk/>
-            <pc:sldMk cId="328472895" sldId="380"/>
-            <ac:spMk id="29" creationId="{00000000-0000-0000-0000-000000000000}"/>
-          </ac:spMkLst>
-        </pc:spChg>
-        <pc:spChg chg="mod">
-          <ac:chgData name="Gerth Stølting Brodal" userId="04ef4784-6591-4f86-a140-f5c3b108582a" providerId="ADAL" clId="{CCA6BA44-85D7-4E34-A506-D12B36546E3D}" dt="2023-02-06T06:50:16.540" v="46" actId="1037"/>
-          <ac:spMkLst>
-            <pc:docMk/>
-            <pc:sldMk cId="328472895" sldId="380"/>
-            <ac:spMk id="30" creationId="{00000000-0000-0000-0000-000000000000}"/>
-          </ac:spMkLst>
-        </pc:spChg>
-        <pc:cxnChg chg="mod">
-          <ac:chgData name="Gerth Stølting Brodal" userId="04ef4784-6591-4f86-a140-f5c3b108582a" providerId="ADAL" clId="{CCA6BA44-85D7-4E34-A506-D12B36546E3D}" dt="2023-02-06T06:50:16.540" v="46" actId="1037"/>
-          <ac:cxnSpMkLst>
-            <pc:docMk/>
-            <pc:sldMk cId="328472895" sldId="380"/>
-            <ac:cxnSpMk id="11" creationId="{00000000-0000-0000-0000-000000000000}"/>
-          </ac:cxnSpMkLst>
-        </pc:cxnChg>
-        <pc:cxnChg chg="mod">
-          <ac:chgData name="Gerth Stølting Brodal" userId="04ef4784-6591-4f86-a140-f5c3b108582a" providerId="ADAL" clId="{CCA6BA44-85D7-4E34-A506-D12B36546E3D}" dt="2023-02-06T06:50:16.540" v="46" actId="1037"/>
-          <ac:cxnSpMkLst>
-            <pc:docMk/>
-            <pc:sldMk cId="328472895" sldId="380"/>
-            <ac:cxnSpMk id="12" creationId="{00000000-0000-0000-0000-000000000000}"/>
-          </ac:cxnSpMkLst>
-        </pc:cxnChg>
-        <pc:cxnChg chg="mod">
-          <ac:chgData name="Gerth Stølting Brodal" userId="04ef4784-6591-4f86-a140-f5c3b108582a" providerId="ADAL" clId="{CCA6BA44-85D7-4E34-A506-D12B36546E3D}" dt="2023-02-06T06:50:16.540" v="46" actId="1037"/>
-          <ac:cxnSpMkLst>
-            <pc:docMk/>
-            <pc:sldMk cId="328472895" sldId="380"/>
-            <ac:cxnSpMk id="13" creationId="{00000000-0000-0000-0000-000000000000}"/>
-          </ac:cxnSpMkLst>
-        </pc:cxnChg>
-        <pc:cxnChg chg="mod">
-          <ac:chgData name="Gerth Stølting Brodal" userId="04ef4784-6591-4f86-a140-f5c3b108582a" providerId="ADAL" clId="{CCA6BA44-85D7-4E34-A506-D12B36546E3D}" dt="2023-02-06T06:50:16.540" v="46" actId="1037"/>
-          <ac:cxnSpMkLst>
-            <pc:docMk/>
-            <pc:sldMk cId="328472895" sldId="380"/>
-            <ac:cxnSpMk id="14" creationId="{00000000-0000-0000-0000-000000000000}"/>
-          </ac:cxnSpMkLst>
-        </pc:cxnChg>
-        <pc:cxnChg chg="mod">
-          <ac:chgData name="Gerth Stølting Brodal" userId="04ef4784-6591-4f86-a140-f5c3b108582a" providerId="ADAL" clId="{CCA6BA44-85D7-4E34-A506-D12B36546E3D}" dt="2023-02-06T06:50:16.540" v="46" actId="1037"/>
-          <ac:cxnSpMkLst>
-            <pc:docMk/>
-            <pc:sldMk cId="328472895" sldId="380"/>
-            <ac:cxnSpMk id="15" creationId="{00000000-0000-0000-0000-000000000000}"/>
-          </ac:cxnSpMkLst>
-        </pc:cxnChg>
       </pc:sldChg>
       <pc:sldChg chg="modSp mod">
         <pc:chgData name="Gerth Stølting Brodal" userId="04ef4784-6591-4f86-a140-f5c3b108582a" providerId="ADAL" clId="{CCA6BA44-85D7-4E34-A506-D12B36546E3D}" dt="2023-02-06T06:48:18.531" v="1" actId="20577"/>
@@ -271,14 +312,6 @@
           <pc:docMk/>
           <pc:sldMk cId="1756381776" sldId="383"/>
         </pc:sldMkLst>
-        <pc:spChg chg="mod">
-          <ac:chgData name="Gerth Stølting Brodal" userId="04ef4784-6591-4f86-a140-f5c3b108582a" providerId="ADAL" clId="{CCA6BA44-85D7-4E34-A506-D12B36546E3D}" dt="2023-02-06T06:48:18.531" v="1" actId="20577"/>
-          <ac:spMkLst>
-            <pc:docMk/>
-            <pc:sldMk cId="1756381776" sldId="383"/>
-            <ac:spMk id="3" creationId="{00000000-0000-0000-0000-000000000000}"/>
-          </ac:spMkLst>
-        </pc:spChg>
       </pc:sldChg>
       <pc:sldChg chg="modSp">
         <pc:chgData name="Gerth Stølting Brodal" userId="04ef4784-6591-4f86-a140-f5c3b108582a" providerId="ADAL" clId="{CCA6BA44-85D7-4E34-A506-D12B36546E3D}" dt="2023-02-06T07:15:19.333" v="57" actId="20577"/>
@@ -286,14 +319,6 @@
           <pc:docMk/>
           <pc:sldMk cId="2572527049" sldId="388"/>
         </pc:sldMkLst>
-        <pc:spChg chg="mod">
-          <ac:chgData name="Gerth Stølting Brodal" userId="04ef4784-6591-4f86-a140-f5c3b108582a" providerId="ADAL" clId="{CCA6BA44-85D7-4E34-A506-D12B36546E3D}" dt="2023-02-06T07:15:19.333" v="57" actId="20577"/>
-          <ac:spMkLst>
-            <pc:docMk/>
-            <pc:sldMk cId="2572527049" sldId="388"/>
-            <ac:spMk id="3" creationId="{00000000-0000-0000-0000-000000000000}"/>
-          </ac:spMkLst>
-        </pc:spChg>
       </pc:sldChg>
     </pc:docChg>
   </pc:docChgLst>
@@ -310,14 +335,6 @@
           <pc:docMk/>
           <pc:sldMk cId="973870306" sldId="273"/>
         </pc:sldMkLst>
-        <pc:spChg chg="mod">
-          <ac:chgData name="Gerth Stølting Brodal" userId="04ef4784-6591-4f86-a140-f5c3b108582a" providerId="ADAL" clId="{DDB2EBFE-BE9D-478D-B155-AD8F8F2B5AB2}" dt="2024-01-30T12:41:42.534" v="33" actId="20577"/>
-          <ac:spMkLst>
-            <pc:docMk/>
-            <pc:sldMk cId="973870306" sldId="273"/>
-            <ac:spMk id="3" creationId="{00000000-0000-0000-0000-000000000000}"/>
-          </ac:spMkLst>
-        </pc:spChg>
       </pc:sldChg>
       <pc:sldChg chg="modNotesTx">
         <pc:chgData name="Gerth Stølting Brodal" userId="04ef4784-6591-4f86-a140-f5c3b108582a" providerId="ADAL" clId="{DDB2EBFE-BE9D-478D-B155-AD8F8F2B5AB2}" dt="2024-02-05T08:02:32.535" v="147" actId="20577"/>
@@ -339,30 +356,6 @@
           <pc:docMk/>
           <pc:sldMk cId="2353739137" sldId="390"/>
         </pc:sldMkLst>
-        <pc:spChg chg="mod">
-          <ac:chgData name="Gerth Stølting Brodal" userId="04ef4784-6591-4f86-a140-f5c3b108582a" providerId="ADAL" clId="{DDB2EBFE-BE9D-478D-B155-AD8F8F2B5AB2}" dt="2024-02-05T08:05:17.719" v="302" actId="6549"/>
-          <ac:spMkLst>
-            <pc:docMk/>
-            <pc:sldMk cId="2353739137" sldId="390"/>
-            <ac:spMk id="2" creationId="{300D2980-7746-9AC1-E353-FFBFA32F3271}"/>
-          </ac:spMkLst>
-        </pc:spChg>
-        <pc:graphicFrameChg chg="add mod">
-          <ac:chgData name="Gerth Stølting Brodal" userId="04ef4784-6591-4f86-a140-f5c3b108582a" providerId="ADAL" clId="{DDB2EBFE-BE9D-478D-B155-AD8F8F2B5AB2}" dt="2024-02-05T08:07:34.012" v="327" actId="554"/>
-          <ac:graphicFrameMkLst>
-            <pc:docMk/>
-            <pc:sldMk cId="2353739137" sldId="390"/>
-            <ac:graphicFrameMk id="4" creationId="{004F710B-956D-6723-B2F5-62E14699C9D1}"/>
-          </ac:graphicFrameMkLst>
-        </pc:graphicFrameChg>
-        <pc:graphicFrameChg chg="add mod modGraphic">
-          <ac:chgData name="Gerth Stølting Brodal" userId="04ef4784-6591-4f86-a140-f5c3b108582a" providerId="ADAL" clId="{DDB2EBFE-BE9D-478D-B155-AD8F8F2B5AB2}" dt="2024-02-05T08:07:34.012" v="327" actId="554"/>
-          <ac:graphicFrameMkLst>
-            <pc:docMk/>
-            <pc:sldMk cId="2353739137" sldId="390"/>
-            <ac:graphicFrameMk id="5" creationId="{3BB6B9DA-B672-2FE0-5D5B-88ABA077A7BB}"/>
-          </ac:graphicFrameMkLst>
-        </pc:graphicFrameChg>
       </pc:sldChg>
     </pc:docChg>
   </pc:docChgLst>
@@ -386,14 +379,6 @@
           <pc:docMk/>
           <pc:sldMk cId="959264993" sldId="291"/>
         </pc:sldMkLst>
-        <pc:spChg chg="mod">
-          <ac:chgData name="Gerth Stølting Brodal" userId="04ef4784-6591-4f86-a140-f5c3b108582a" providerId="ADAL" clId="{2FC3BC44-7AD5-499A-9E6F-BCA215DBF3B1}" dt="2022-02-07T07:21:44.250" v="328" actId="20577"/>
-          <ac:spMkLst>
-            <pc:docMk/>
-            <pc:sldMk cId="959264993" sldId="291"/>
-            <ac:spMk id="3" creationId="{00000000-0000-0000-0000-000000000000}"/>
-          </ac:spMkLst>
-        </pc:spChg>
       </pc:sldChg>
       <pc:sldChg chg="modNotesTx">
         <pc:chgData name="Gerth Stølting Brodal" userId="04ef4784-6591-4f86-a140-f5c3b108582a" providerId="ADAL" clId="{2FC3BC44-7AD5-499A-9E6F-BCA215DBF3B1}" dt="2022-02-06T09:16:42.150" v="95" actId="20577"/>
@@ -415,46 +400,6 @@
           <pc:docMk/>
           <pc:sldMk cId="795770451" sldId="389"/>
         </pc:sldMkLst>
-        <pc:spChg chg="mod">
-          <ac:chgData name="Gerth Stølting Brodal" userId="04ef4784-6591-4f86-a140-f5c3b108582a" providerId="ADAL" clId="{2FC3BC44-7AD5-499A-9E6F-BCA215DBF3B1}" dt="2022-02-06T09:47:54.447" v="217" actId="20577"/>
-          <ac:spMkLst>
-            <pc:docMk/>
-            <pc:sldMk cId="795770451" sldId="389"/>
-            <ac:spMk id="2" creationId="{91BDC123-E5D6-4B1E-838D-428C0508E6B1}"/>
-          </ac:spMkLst>
-        </pc:spChg>
-        <pc:spChg chg="del">
-          <ac:chgData name="Gerth Stølting Brodal" userId="04ef4784-6591-4f86-a140-f5c3b108582a" providerId="ADAL" clId="{2FC3BC44-7AD5-499A-9E6F-BCA215DBF3B1}" dt="2022-02-06T09:40:50.998" v="124" actId="478"/>
-          <ac:spMkLst>
-            <pc:docMk/>
-            <pc:sldMk cId="795770451" sldId="389"/>
-            <ac:spMk id="3" creationId="{658D0D55-B8CF-47C7-8F86-495A41E07603}"/>
-          </ac:spMkLst>
-        </pc:spChg>
-        <pc:graphicFrameChg chg="add mod modGraphic">
-          <ac:chgData name="Gerth Stølting Brodal" userId="04ef4784-6591-4f86-a140-f5c3b108582a" providerId="ADAL" clId="{2FC3BC44-7AD5-499A-9E6F-BCA215DBF3B1}" dt="2022-02-06T09:45:54.599" v="183" actId="20577"/>
-          <ac:graphicFrameMkLst>
-            <pc:docMk/>
-            <pc:sldMk cId="795770451" sldId="389"/>
-            <ac:graphicFrameMk id="4" creationId="{E47B0A96-A9F4-4F69-8933-393AB0B1C5AE}"/>
-          </ac:graphicFrameMkLst>
-        </pc:graphicFrameChg>
-        <pc:graphicFrameChg chg="add mod modGraphic">
-          <ac:chgData name="Gerth Stølting Brodal" userId="04ef4784-6591-4f86-a140-f5c3b108582a" providerId="ADAL" clId="{2FC3BC44-7AD5-499A-9E6F-BCA215DBF3B1}" dt="2022-02-06T09:46:02.986" v="192" actId="5793"/>
-          <ac:graphicFrameMkLst>
-            <pc:docMk/>
-            <pc:sldMk cId="795770451" sldId="389"/>
-            <ac:graphicFrameMk id="5" creationId="{84A6A35F-BAC9-4890-8CB9-B588AA5F8D34}"/>
-          </ac:graphicFrameMkLst>
-        </pc:graphicFrameChg>
-        <pc:picChg chg="add mod">
-          <ac:chgData name="Gerth Stølting Brodal" userId="04ef4784-6591-4f86-a140-f5c3b108582a" providerId="ADAL" clId="{2FC3BC44-7AD5-499A-9E6F-BCA215DBF3B1}" dt="2022-02-06T09:45:03.484" v="174" actId="1076"/>
-          <ac:picMkLst>
-            <pc:docMk/>
-            <pc:sldMk cId="795770451" sldId="389"/>
-            <ac:picMk id="6" creationId="{5F11C221-8A2B-4CD1-A546-36CEDD4082C4}"/>
-          </ac:picMkLst>
-        </pc:picChg>
       </pc:sldChg>
     </pc:docChg>
   </pc:docChgLst>
@@ -543,7 +488,7 @@
           <a:p>
             <a:fld id="{FB1A172F-81D4-4DC4-9113-1DBD56EC3646}" type="datetimeFigureOut">
               <a:rPr lang="en-US" smtClean="0"/>
-              <a:t>2/5/2024</a:t>
+              <a:t>12/18/2024</a:t>
             </a:fld>
             <a:endParaRPr lang="en-US"/>
           </a:p>
@@ -1755,6 +1700,252 @@
           <a:lstStyle/>
           <a:p>
             <a:r>
+              <a:rPr lang="da-DK" dirty="0" err="1"/>
+              <a:t>Binary</a:t>
+            </a:r>
+            <a:r>
+              <a:rPr lang="da-DK" dirty="0"/>
+              <a:t> </a:t>
+            </a:r>
+            <a:r>
+              <a:rPr lang="da-DK" dirty="0" err="1"/>
+              <a:t>search</a:t>
+            </a:r>
+            <a:r>
+              <a:rPr lang="da-DK" dirty="0"/>
+              <a:t> is tricky, </a:t>
+            </a:r>
+            <a:r>
+              <a:rPr lang="da-DK" dirty="0" err="1"/>
+              <a:t>sometimes</a:t>
+            </a:r>
+            <a:r>
+              <a:rPr lang="da-DK" dirty="0"/>
+              <a:t> </a:t>
+            </a:r>
+            <a:r>
+              <a:rPr lang="da-DK" dirty="0" err="1"/>
+              <a:t>you</a:t>
+            </a:r>
+            <a:r>
+              <a:rPr lang="da-DK" dirty="0"/>
+              <a:t> </a:t>
+            </a:r>
+            <a:r>
+              <a:rPr lang="da-DK" dirty="0" err="1"/>
+              <a:t>can</a:t>
+            </a:r>
+            <a:r>
+              <a:rPr lang="da-DK" dirty="0"/>
+              <a:t> </a:t>
+            </a:r>
+            <a:r>
+              <a:rPr lang="da-DK" dirty="0" err="1"/>
+              <a:t>use</a:t>
+            </a:r>
+            <a:r>
+              <a:rPr lang="da-DK" dirty="0"/>
+              <a:t> a </a:t>
+            </a:r>
+            <a:r>
+              <a:rPr lang="da-DK" dirty="0" err="1"/>
+              <a:t>library</a:t>
+            </a:r>
+            <a:r>
+              <a:rPr lang="da-DK" dirty="0"/>
+              <a:t> to </a:t>
+            </a:r>
+            <a:r>
+              <a:rPr lang="da-DK" dirty="0" err="1"/>
+              <a:t>make</a:t>
+            </a:r>
+            <a:r>
+              <a:rPr lang="da-DK" dirty="0"/>
+              <a:t> </a:t>
+            </a:r>
+            <a:r>
+              <a:rPr lang="da-DK" dirty="0" err="1"/>
+              <a:t>your</a:t>
+            </a:r>
+            <a:r>
+              <a:rPr lang="da-DK" dirty="0"/>
+              <a:t> </a:t>
+            </a:r>
+            <a:r>
+              <a:rPr lang="da-DK" dirty="0" err="1"/>
+              <a:t>life</a:t>
+            </a:r>
+            <a:r>
+              <a:rPr lang="da-DK" dirty="0"/>
+              <a:t> </a:t>
+            </a:r>
+            <a:r>
+              <a:rPr lang="da-DK" dirty="0" err="1"/>
+              <a:t>easier</a:t>
+            </a:r>
+            <a:endParaRPr lang="da-DK" dirty="0"/>
+          </a:p>
+          <a:p>
+            <a:r>
+              <a:rPr lang="en-US" dirty="0"/>
+              <a:t>Sometimes you cannot use bisect, e.g. when bisecting for a float value, like the float sqrt(x)</a:t>
+            </a:r>
+          </a:p>
+          <a:p>
+            <a:r>
+              <a:rPr lang="en-US" dirty="0" err="1"/>
+              <a:t>int_sqrt</a:t>
+            </a:r>
+            <a:r>
+              <a:rPr lang="en-US" dirty="0"/>
+              <a:t>(x)</a:t>
+            </a:r>
+          </a:p>
+          <a:p>
+            <a:r>
+              <a:rPr lang="en-US" dirty="0"/>
+              <a:t>= </a:t>
+            </a:r>
+            <a:r>
+              <a:rPr lang="en-US" dirty="0" err="1"/>
+              <a:t>bisect_right</a:t>
+            </a:r>
+            <a:r>
+              <a:rPr lang="en-US" dirty="0"/>
+              <a:t>(range(x + 1), False, key=lambda r: r*r &gt; x) – 1</a:t>
+            </a:r>
+          </a:p>
+          <a:p>
+            <a:r>
+              <a:rPr lang="en-US" dirty="0"/>
+              <a:t>= </a:t>
+            </a:r>
+            <a:r>
+              <a:rPr lang="en-US" dirty="0" err="1"/>
+              <a:t>bisect_right</a:t>
+            </a:r>
+            <a:r>
+              <a:rPr lang="en-US" dirty="0"/>
+              <a:t>(range(x + 1), x, key=lambda i: i*i) – 1</a:t>
+            </a:r>
+          </a:p>
+          <a:p>
+            <a:pPr marL="0" marR="0" lvl="0" indent="0" algn="l" defTabSz="914400" rtl="0" eaLnBrk="1" fontAlgn="auto" latinLnBrk="0" hangingPunct="1">
+              <a:lnSpc>
+                <a:spcPct val="100000"/>
+              </a:lnSpc>
+              <a:spcBef>
+                <a:spcPts val="0"/>
+              </a:spcBef>
+              <a:spcAft>
+                <a:spcPts val="0"/>
+              </a:spcAft>
+              <a:buClrTx/>
+              <a:buSzTx/>
+              <a:buFontTx/>
+              <a:buNone/>
+              <a:tabLst/>
+              <a:defRPr/>
+            </a:pPr>
+            <a:r>
+              <a:rPr lang="en-US" dirty="0"/>
+              <a:t>= </a:t>
+            </a:r>
+            <a:r>
+              <a:rPr lang="en-US" dirty="0" err="1"/>
+              <a:t>bisect_right</a:t>
+            </a:r>
+            <a:r>
+              <a:rPr lang="en-US" dirty="0"/>
+              <a:t>([x**2 for x in range(x+2)], x) – 1  # inefficient</a:t>
+            </a:r>
+          </a:p>
+          <a:p>
+            <a:endParaRPr lang="en-US" dirty="0"/>
+          </a:p>
+        </p:txBody>
+      </p:sp>
+      <p:sp>
+        <p:nvSpPr>
+          <p:cNvPr id="4" name="Slide Number Placeholder 3"/>
+          <p:cNvSpPr>
+            <a:spLocks noGrp="1"/>
+          </p:cNvSpPr>
+          <p:nvPr>
+            <p:ph type="sldNum" sz="quarter" idx="5"/>
+          </p:nvPr>
+        </p:nvSpPr>
+        <p:spPr/>
+        <p:txBody>
+          <a:bodyPr/>
+          <a:lstStyle/>
+          <a:p>
+            <a:fld id="{CD563DD8-32AB-41BE-B1C6-8EAC45222ACE}" type="slidenum">
+              <a:rPr lang="en-US" smtClean="0"/>
+              <a:t>15</a:t>
+            </a:fld>
+            <a:endParaRPr lang="en-US"/>
+          </a:p>
+        </p:txBody>
+      </p:sp>
+    </p:spTree>
+    <p:extLst>
+      <p:ext uri="{BB962C8B-B14F-4D97-AF65-F5344CB8AC3E}">
+        <p14:creationId xmlns:p14="http://schemas.microsoft.com/office/powerpoint/2010/main" val="3551279688"/>
+      </p:ext>
+    </p:extLst>
+  </p:cSld>
+  <p:clrMapOvr>
+    <a:masterClrMapping/>
+  </p:clrMapOvr>
+</p:notes>
+</file>
+
+<file path=ppt/notesSlides/notesSlide9.xml><?xml version="1.0" encoding="utf-8"?>
+<p:notes xmlns:a="http://schemas.openxmlformats.org/drawingml/2006/main" xmlns:r="http://schemas.openxmlformats.org/officeDocument/2006/relationships" xmlns:p="http://schemas.openxmlformats.org/presentationml/2006/main">
+  <p:cSld>
+    <p:spTree>
+      <p:nvGrpSpPr>
+        <p:cNvPr id="1" name=""/>
+        <p:cNvGrpSpPr/>
+        <p:nvPr/>
+      </p:nvGrpSpPr>
+      <p:grpSpPr>
+        <a:xfrm>
+          <a:off x="0" y="0"/>
+          <a:ext cx="0" cy="0"/>
+          <a:chOff x="0" y="0"/>
+          <a:chExt cx="0" cy="0"/>
+        </a:xfrm>
+      </p:grpSpPr>
+      <p:sp>
+        <p:nvSpPr>
+          <p:cNvPr id="2" name="Slide Image Placeholder 1"/>
+          <p:cNvSpPr>
+            <a:spLocks noGrp="1" noRot="1" noChangeAspect="1"/>
+          </p:cNvSpPr>
+          <p:nvPr>
+            <p:ph type="sldImg"/>
+          </p:nvPr>
+        </p:nvSpPr>
+        <p:spPr/>
+      </p:sp>
+      <p:sp>
+        <p:nvSpPr>
+          <p:cNvPr id="3" name="Notes Placeholder 2"/>
+          <p:cNvSpPr>
+            <a:spLocks noGrp="1"/>
+          </p:cNvSpPr>
+          <p:nvPr>
+            <p:ph type="body" idx="1"/>
+          </p:nvPr>
+        </p:nvSpPr>
+        <p:spPr/>
+        <p:txBody>
+          <a:bodyPr/>
+          <a:lstStyle/>
+          <a:p>
+            <a:r>
               <a:rPr lang="en-US" dirty="0"/>
               <a:t>Run</a:t>
             </a:r>
@@ -1897,7 +2088,7 @@
           <a:p>
             <a:fld id="{CD563DD8-32AB-41BE-B1C6-8EAC45222ACE}" type="slidenum">
               <a:rPr lang="en-US" smtClean="0"/>
-              <a:t>15</a:t>
+              <a:t>16</a:t>
             </a:fld>
             <a:endParaRPr lang="en-US"/>
           </a:p>
@@ -2053,7 +2244,7 @@
           <a:p>
             <a:fld id="{0560A9CD-0304-4E0B-9E82-E7E0115DE05B}" type="datetimeFigureOut">
               <a:rPr lang="en-US" smtClean="0"/>
-              <a:t>2/5/2024</a:t>
+              <a:t>12/18/2024</a:t>
             </a:fld>
             <a:endParaRPr lang="en-US"/>
           </a:p>
@@ -2221,7 +2412,7 @@
           <a:p>
             <a:fld id="{0560A9CD-0304-4E0B-9E82-E7E0115DE05B}" type="datetimeFigureOut">
               <a:rPr lang="en-US" smtClean="0"/>
-              <a:t>2/5/2024</a:t>
+              <a:t>12/18/2024</a:t>
             </a:fld>
             <a:endParaRPr lang="en-US"/>
           </a:p>
@@ -2399,7 +2590,7 @@
           <a:p>
             <a:fld id="{0560A9CD-0304-4E0B-9E82-E7E0115DE05B}" type="datetimeFigureOut">
               <a:rPr lang="en-US" smtClean="0"/>
-              <a:t>2/5/2024</a:t>
+              <a:t>12/18/2024</a:t>
             </a:fld>
             <a:endParaRPr lang="en-US"/>
           </a:p>
@@ -2576,7 +2767,7 @@
           <a:p>
             <a:fld id="{0560A9CD-0304-4E0B-9E82-E7E0115DE05B}" type="datetimeFigureOut">
               <a:rPr lang="en-US" smtClean="0"/>
-              <a:t>2/5/2024</a:t>
+              <a:t>12/18/2024</a:t>
             </a:fld>
             <a:endParaRPr lang="en-US"/>
           </a:p>
@@ -2821,7 +3012,7 @@
           <a:p>
             <a:fld id="{0560A9CD-0304-4E0B-9E82-E7E0115DE05B}" type="datetimeFigureOut">
               <a:rPr lang="en-US" smtClean="0"/>
-              <a:t>2/5/2024</a:t>
+              <a:t>12/18/2024</a:t>
             </a:fld>
             <a:endParaRPr lang="en-US"/>
           </a:p>
@@ -3050,7 +3241,7 @@
           <a:p>
             <a:fld id="{0560A9CD-0304-4E0B-9E82-E7E0115DE05B}" type="datetimeFigureOut">
               <a:rPr lang="en-US" smtClean="0"/>
-              <a:t>2/5/2024</a:t>
+              <a:t>12/18/2024</a:t>
             </a:fld>
             <a:endParaRPr lang="en-US"/>
           </a:p>
@@ -3414,7 +3605,7 @@
           <a:p>
             <a:fld id="{0560A9CD-0304-4E0B-9E82-E7E0115DE05B}" type="datetimeFigureOut">
               <a:rPr lang="en-US" smtClean="0"/>
-              <a:t>2/5/2024</a:t>
+              <a:t>12/18/2024</a:t>
             </a:fld>
             <a:endParaRPr lang="en-US"/>
           </a:p>
@@ -3531,7 +3722,7 @@
           <a:p>
             <a:fld id="{0560A9CD-0304-4E0B-9E82-E7E0115DE05B}" type="datetimeFigureOut">
               <a:rPr lang="en-US" smtClean="0"/>
-              <a:t>2/5/2024</a:t>
+              <a:t>12/18/2024</a:t>
             </a:fld>
             <a:endParaRPr lang="en-US"/>
           </a:p>
@@ -3626,7 +3817,7 @@
           <a:p>
             <a:fld id="{0560A9CD-0304-4E0B-9E82-E7E0115DE05B}" type="datetimeFigureOut">
               <a:rPr lang="en-US" smtClean="0"/>
-              <a:t>2/5/2024</a:t>
+              <a:t>12/18/2024</a:t>
             </a:fld>
             <a:endParaRPr lang="en-US"/>
           </a:p>
@@ -3901,7 +4092,7 @@
           <a:p>
             <a:fld id="{0560A9CD-0304-4E0B-9E82-E7E0115DE05B}" type="datetimeFigureOut">
               <a:rPr lang="en-US" smtClean="0"/>
-              <a:t>2/5/2024</a:t>
+              <a:t>12/18/2024</a:t>
             </a:fld>
             <a:endParaRPr lang="en-US"/>
           </a:p>
@@ -4153,7 +4344,7 @@
           <a:p>
             <a:fld id="{0560A9CD-0304-4E0B-9E82-E7E0115DE05B}" type="datetimeFigureOut">
               <a:rPr lang="en-US" smtClean="0"/>
-              <a:t>2/5/2024</a:t>
+              <a:t>12/18/2024</a:t>
             </a:fld>
             <a:endParaRPr lang="en-US"/>
           </a:p>
@@ -4364,7 +4555,7 @@
           <a:p>
             <a:fld id="{0560A9CD-0304-4E0B-9E82-E7E0115DE05B}" type="datetimeFigureOut">
               <a:rPr lang="en-US" smtClean="0"/>
-              <a:t>2/5/2024</a:t>
+              <a:t>12/18/2024</a:t>
             </a:fld>
             <a:endParaRPr lang="en-US"/>
           </a:p>
@@ -13581,6 +13772,2417 @@
       </p:grpSpPr>
       <p:sp>
         <p:nvSpPr>
+          <p:cNvPr id="2" name="Title 1">
+            <a:extLst>
+              <a:ext uri="{FF2B5EF4-FFF2-40B4-BE49-F238E27FC236}">
+                <a16:creationId xmlns:a16="http://schemas.microsoft.com/office/drawing/2014/main" id="{5C6EB888-E169-9745-52B4-AD4A7CA428B9}"/>
+              </a:ext>
+            </a:extLst>
+          </p:cNvPr>
+          <p:cNvSpPr>
+            <a:spLocks noGrp="1"/>
+          </p:cNvSpPr>
+          <p:nvPr>
+            <p:ph type="title"/>
+          </p:nvPr>
+        </p:nvSpPr>
+        <p:spPr>
+          <a:xfrm>
+            <a:off x="254650" y="365125"/>
+            <a:ext cx="10515600" cy="1325563"/>
+          </a:xfrm>
+        </p:spPr>
+        <p:txBody>
+          <a:bodyPr/>
+          <a:lstStyle/>
+          <a:p>
+            <a:r>
+              <a:rPr lang="da-DK" dirty="0" err="1">
+                <a:cs typeface="Courier New" panose="02070309020205020404" pitchFamily="49" charset="0"/>
+              </a:rPr>
+              <a:t>bisect</a:t>
+            </a:r>
+            <a:endParaRPr lang="en-US" dirty="0">
+              <a:cs typeface="Courier New" panose="02070309020205020404" pitchFamily="49" charset="0"/>
+            </a:endParaRPr>
+          </a:p>
+        </p:txBody>
+      </p:sp>
+      <p:sp>
+        <p:nvSpPr>
+          <p:cNvPr id="3" name="Content Placeholder 2">
+            <a:extLst>
+              <a:ext uri="{FF2B5EF4-FFF2-40B4-BE49-F238E27FC236}">
+                <a16:creationId xmlns:a16="http://schemas.microsoft.com/office/drawing/2014/main" id="{5FB15087-8789-1E86-2833-C8282CE6B5C3}"/>
+              </a:ext>
+            </a:extLst>
+          </p:cNvPr>
+          <p:cNvSpPr>
+            <a:spLocks noGrp="1"/>
+          </p:cNvSpPr>
+          <p:nvPr>
+            <p:ph idx="1"/>
+          </p:nvPr>
+        </p:nvSpPr>
+        <p:spPr>
+          <a:xfrm>
+            <a:off x="254650" y="1825625"/>
+            <a:ext cx="5345046" cy="2585349"/>
+          </a:xfrm>
+        </p:spPr>
+        <p:txBody>
+          <a:bodyPr>
+            <a:normAutofit/>
+          </a:bodyPr>
+          <a:lstStyle/>
+          <a:p>
+            <a:r>
+              <a:rPr lang="en-US" sz="2400" b="1" dirty="0"/>
+              <a:t>Note  </a:t>
+            </a:r>
+            <a:r>
+              <a:rPr lang="en-US" sz="2400" dirty="0"/>
+              <a:t>Binary search on sorted lists is </a:t>
+            </a:r>
+            <a:r>
+              <a:rPr lang="en-US" sz="2400"/>
+              <a:t>supported by </a:t>
+            </a:r>
+            <a:r>
+              <a:rPr lang="en-US" sz="2400" dirty="0"/>
+              <a:t>the standard library module </a:t>
+            </a:r>
+            <a:r>
+              <a:rPr lang="en-US" sz="2400" dirty="0">
+                <a:solidFill>
+                  <a:srgbClr val="C00000"/>
+                </a:solidFill>
+                <a:latin typeface="Courier New" panose="02070309020205020404" pitchFamily="49" charset="0"/>
+                <a:cs typeface="Courier New" panose="02070309020205020404" pitchFamily="49" charset="0"/>
+              </a:rPr>
+              <a:t>bisect</a:t>
+            </a:r>
+          </a:p>
+          <a:p>
+            <a:r>
+              <a:rPr lang="en-US" sz="2400" dirty="0" err="1">
+                <a:solidFill>
+                  <a:srgbClr val="C00000"/>
+                </a:solidFill>
+                <a:latin typeface="Courier New" panose="02070309020205020404" pitchFamily="49" charset="0"/>
+                <a:cs typeface="Courier New" panose="02070309020205020404" pitchFamily="49" charset="0"/>
+              </a:rPr>
+              <a:t>bisect_left</a:t>
+            </a:r>
+            <a:r>
+              <a:rPr lang="en-US" sz="2400" dirty="0"/>
+              <a:t> and </a:t>
+            </a:r>
+            <a:r>
+              <a:rPr lang="en-US" sz="2400" dirty="0" err="1">
+                <a:solidFill>
+                  <a:srgbClr val="C00000"/>
+                </a:solidFill>
+                <a:latin typeface="Courier New" panose="02070309020205020404" pitchFamily="49" charset="0"/>
+                <a:cs typeface="Courier New" panose="02070309020205020404" pitchFamily="49" charset="0"/>
+              </a:rPr>
+              <a:t>bisect_right</a:t>
+            </a:r>
+            <a:r>
+              <a:rPr lang="en-US" sz="2400" dirty="0">
+                <a:solidFill>
+                  <a:srgbClr val="C00000"/>
+                </a:solidFill>
+              </a:rPr>
+              <a:t> </a:t>
+            </a:r>
+            <a:r>
+              <a:rPr lang="en-US" sz="2400" dirty="0"/>
+              <a:t>return the </a:t>
+            </a:r>
+            <a:r>
+              <a:rPr lang="en-US" sz="2400" i="1" dirty="0"/>
+              <a:t>insertion point</a:t>
+            </a:r>
+            <a:r>
+              <a:rPr lang="en-US" sz="2400" dirty="0"/>
+              <a:t> before and after, respectively, of existing occurrences of the value</a:t>
+            </a:r>
+            <a:endParaRPr lang="en-US" sz="2400" dirty="0">
+              <a:latin typeface="Courier New" panose="02070309020205020404" pitchFamily="49" charset="0"/>
+              <a:cs typeface="Courier New" panose="02070309020205020404" pitchFamily="49" charset="0"/>
+            </a:endParaRPr>
+          </a:p>
+          <a:p>
+            <a:pPr marL="0" indent="0">
+              <a:buNone/>
+            </a:pPr>
+            <a:endParaRPr lang="en-US" sz="2400" dirty="0"/>
+          </a:p>
+          <a:p>
+            <a:endParaRPr lang="en-US" sz="2400" dirty="0"/>
+          </a:p>
+        </p:txBody>
+      </p:sp>
+      <p:graphicFrame>
+        <p:nvGraphicFramePr>
+          <p:cNvPr id="11" name="Table 10">
+            <a:extLst>
+              <a:ext uri="{FF2B5EF4-FFF2-40B4-BE49-F238E27FC236}">
+                <a16:creationId xmlns:a16="http://schemas.microsoft.com/office/drawing/2014/main" id="{02F531C8-5154-8ABB-8F78-8E20CC705335}"/>
+              </a:ext>
+            </a:extLst>
+          </p:cNvPr>
+          <p:cNvGraphicFramePr>
+            <a:graphicFrameLocks noGrp="1"/>
+          </p:cNvGraphicFramePr>
+          <p:nvPr>
+            <p:extLst>
+              <p:ext uri="{D42A27DB-BD31-4B8C-83A1-F6EECF244321}">
+                <p14:modId xmlns:p14="http://schemas.microsoft.com/office/powerpoint/2010/main" val="3280481968"/>
+              </p:ext>
+            </p:extLst>
+          </p:nvPr>
+        </p:nvGraphicFramePr>
+        <p:xfrm>
+          <a:off x="5991828" y="987000"/>
+          <a:ext cx="5855980" cy="3779520"/>
+        </p:xfrm>
+        <a:graphic>
+          <a:graphicData uri="http://schemas.openxmlformats.org/drawingml/2006/table">
+            <a:tbl>
+              <a:tblPr firstRow="1" bandRow="1">
+                <a:tableStyleId>{5C22544A-7EE6-4342-B048-85BDC9FD1C3A}</a:tableStyleId>
+              </a:tblPr>
+              <a:tblGrid>
+                <a:gridCol w="5855980">
+                  <a:extLst>
+                    <a:ext uri="{9D8B030D-6E8A-4147-A177-3AD203B41FA5}">
+                      <a16:colId xmlns:a16="http://schemas.microsoft.com/office/drawing/2014/main" val="1873682825"/>
+                    </a:ext>
+                  </a:extLst>
+                </a:gridCol>
+              </a:tblGrid>
+              <a:tr h="179367">
+                <a:tc>
+                  <a:txBody>
+                    <a:bodyPr/>
+                    <a:lstStyle/>
+                    <a:p>
+                      <a:r>
+                        <a:rPr lang="da-DK" sz="1600" b="1" dirty="0">
+                          <a:latin typeface="Courier New" panose="02070309020205020404" pitchFamily="49" charset="0"/>
+                          <a:cs typeface="Courier New" panose="02070309020205020404" pitchFamily="49" charset="0"/>
+                        </a:rPr>
+                        <a:t>binary_search_bisect.py</a:t>
+                      </a:r>
+                    </a:p>
+                  </a:txBody>
+                  <a:tcPr anchor="ctr">
+                    <a:lnL w="6350" cap="flat" cmpd="sng" algn="ctr">
+                      <a:solidFill>
+                        <a:schemeClr val="tx1"/>
+                      </a:solidFill>
+                      <a:prstDash val="solid"/>
+                      <a:round/>
+                      <a:headEnd type="none" w="med" len="med"/>
+                      <a:tailEnd type="none" w="med" len="med"/>
+                    </a:lnL>
+                    <a:lnR w="6350" cap="flat" cmpd="sng" algn="ctr">
+                      <a:solidFill>
+                        <a:schemeClr val="tx1"/>
+                      </a:solidFill>
+                      <a:prstDash val="solid"/>
+                      <a:round/>
+                      <a:headEnd type="none" w="med" len="med"/>
+                      <a:tailEnd type="none" w="med" len="med"/>
+                    </a:lnR>
+                    <a:lnT w="6350" cap="flat" cmpd="sng" algn="ctr">
+                      <a:solidFill>
+                        <a:schemeClr val="tx1"/>
+                      </a:solidFill>
+                      <a:prstDash val="solid"/>
+                      <a:round/>
+                      <a:headEnd type="none" w="med" len="med"/>
+                      <a:tailEnd type="none" w="med" len="med"/>
+                    </a:lnT>
+                    <a:lnB w="6350" cap="flat" cmpd="sng" algn="ctr">
+                      <a:solidFill>
+                        <a:schemeClr val="tx1"/>
+                      </a:solidFill>
+                      <a:prstDash val="solid"/>
+                      <a:round/>
+                      <a:headEnd type="none" w="med" len="med"/>
+                      <a:tailEnd type="none" w="med" len="med"/>
+                    </a:lnB>
+                    <a:lnTlToBr w="12700" cmpd="sng">
+                      <a:noFill/>
+                      <a:prstDash val="solid"/>
+                    </a:lnTlToBr>
+                    <a:lnBlToTr w="12700" cmpd="sng">
+                      <a:noFill/>
+                      <a:prstDash val="solid"/>
+                    </a:lnBlToTr>
+                    <a:solidFill>
+                      <a:srgbClr val="C00000"/>
+                    </a:solidFill>
+                  </a:tcPr>
+                </a:tc>
+                <a:extLst>
+                  <a:ext uri="{0D108BD9-81ED-4DB2-BD59-A6C34878D82A}">
+                    <a16:rowId xmlns:a16="http://schemas.microsoft.com/office/drawing/2014/main" val="3330819881"/>
+                  </a:ext>
+                </a:extLst>
+              </a:tr>
+              <a:tr h="1092506">
+                <a:tc>
+                  <a:txBody>
+                    <a:bodyPr/>
+                    <a:lstStyle/>
+                    <a:p>
+                      <a:r>
+                        <a:rPr lang="en-US" sz="1600" b="1" dirty="0">
+                          <a:solidFill>
+                            <a:schemeClr val="tx1"/>
+                          </a:solidFill>
+                          <a:latin typeface="Courier New" panose="02070309020205020404" pitchFamily="49" charset="0"/>
+                          <a:cs typeface="Courier New" panose="02070309020205020404" pitchFamily="49" charset="0"/>
+                        </a:rPr>
+                        <a:t>from </a:t>
+                      </a:r>
+                      <a:r>
+                        <a:rPr lang="en-US" sz="1600" b="1" dirty="0">
+                          <a:solidFill>
+                            <a:srgbClr val="C00000"/>
+                          </a:solidFill>
+                          <a:latin typeface="Courier New" panose="02070309020205020404" pitchFamily="49" charset="0"/>
+                          <a:cs typeface="Courier New" panose="02070309020205020404" pitchFamily="49" charset="0"/>
+                        </a:rPr>
+                        <a:t>bisect</a:t>
+                      </a:r>
+                      <a:r>
+                        <a:rPr lang="en-US" sz="1600" b="1" dirty="0">
+                          <a:solidFill>
+                            <a:schemeClr val="tx1"/>
+                          </a:solidFill>
+                          <a:latin typeface="Courier New" panose="02070309020205020404" pitchFamily="49" charset="0"/>
+                          <a:cs typeface="Courier New" panose="02070309020205020404" pitchFamily="49" charset="0"/>
+                        </a:rPr>
+                        <a:t> import </a:t>
+                      </a:r>
+                      <a:r>
+                        <a:rPr lang="en-US" sz="1600" b="1" dirty="0" err="1">
+                          <a:solidFill>
+                            <a:srgbClr val="C00000"/>
+                          </a:solidFill>
+                          <a:latin typeface="Courier New" panose="02070309020205020404" pitchFamily="49" charset="0"/>
+                          <a:cs typeface="Courier New" panose="02070309020205020404" pitchFamily="49" charset="0"/>
+                        </a:rPr>
+                        <a:t>bisect_left</a:t>
+                      </a:r>
+                      <a:r>
+                        <a:rPr lang="en-US" sz="1600" b="1" dirty="0">
+                          <a:solidFill>
+                            <a:schemeClr val="tx1"/>
+                          </a:solidFill>
+                          <a:latin typeface="Courier New" panose="02070309020205020404" pitchFamily="49" charset="0"/>
+                          <a:cs typeface="Courier New" panose="02070309020205020404" pitchFamily="49" charset="0"/>
+                        </a:rPr>
+                        <a:t>, </a:t>
+                      </a:r>
+                      <a:r>
+                        <a:rPr lang="en-US" sz="1600" b="1" dirty="0" err="1">
+                          <a:solidFill>
+                            <a:srgbClr val="C00000"/>
+                          </a:solidFill>
+                          <a:latin typeface="Courier New" panose="02070309020205020404" pitchFamily="49" charset="0"/>
+                          <a:cs typeface="Courier New" panose="02070309020205020404" pitchFamily="49" charset="0"/>
+                        </a:rPr>
+                        <a:t>bisect_right</a:t>
+                      </a:r>
+                      <a:endParaRPr lang="en-US" sz="1600" b="1" dirty="0">
+                        <a:solidFill>
+                          <a:srgbClr val="C00000"/>
+                        </a:solidFill>
+                        <a:latin typeface="Courier New" panose="02070309020205020404" pitchFamily="49" charset="0"/>
+                        <a:cs typeface="Courier New" panose="02070309020205020404" pitchFamily="49" charset="0"/>
+                      </a:endParaRPr>
+                    </a:p>
+                    <a:p>
+                      <a:endParaRPr lang="en-US" sz="1600" b="1" dirty="0">
+                        <a:solidFill>
+                          <a:schemeClr val="tx1"/>
+                        </a:solidFill>
+                        <a:latin typeface="Courier New" panose="02070309020205020404" pitchFamily="49" charset="0"/>
+                        <a:cs typeface="Courier New" panose="02070309020205020404" pitchFamily="49" charset="0"/>
+                      </a:endParaRPr>
+                    </a:p>
+                    <a:p>
+                      <a:r>
+                        <a:rPr lang="en-US" sz="1600" b="1" dirty="0">
+                          <a:solidFill>
+                            <a:schemeClr val="tx1"/>
+                          </a:solidFill>
+                          <a:latin typeface="Courier New" panose="02070309020205020404" pitchFamily="49" charset="0"/>
+                          <a:cs typeface="Courier New" panose="02070309020205020404" pitchFamily="49" charset="0"/>
+                        </a:rPr>
+                        <a:t>L = [3, 4, 6, 7, 7, 7, 10, 11, 13, 16, 17]</a:t>
+                      </a:r>
+                    </a:p>
+                    <a:p>
+                      <a:endParaRPr lang="en-US" sz="1600" b="1" dirty="0">
+                        <a:solidFill>
+                          <a:schemeClr val="tx1"/>
+                        </a:solidFill>
+                        <a:latin typeface="Courier New" panose="02070309020205020404" pitchFamily="49" charset="0"/>
+                        <a:cs typeface="Courier New" panose="02070309020205020404" pitchFamily="49" charset="0"/>
+                      </a:endParaRPr>
+                    </a:p>
+                    <a:p>
+                      <a:r>
+                        <a:rPr lang="en-US" sz="1600" b="1" dirty="0">
+                          <a:solidFill>
+                            <a:schemeClr val="tx1"/>
+                          </a:solidFill>
+                          <a:latin typeface="Courier New" panose="02070309020205020404" pitchFamily="49" charset="0"/>
+                          <a:cs typeface="Courier New" panose="02070309020205020404" pitchFamily="49" charset="0"/>
+                        </a:rPr>
+                        <a:t>print(</a:t>
+                      </a:r>
+                      <a:r>
+                        <a:rPr lang="en-US" sz="1600" b="1" dirty="0" err="1">
+                          <a:solidFill>
+                            <a:srgbClr val="C00000"/>
+                          </a:solidFill>
+                          <a:latin typeface="Courier New" panose="02070309020205020404" pitchFamily="49" charset="0"/>
+                          <a:cs typeface="Courier New" panose="02070309020205020404" pitchFamily="49" charset="0"/>
+                        </a:rPr>
+                        <a:t>bisect_left</a:t>
+                      </a:r>
+                      <a:r>
+                        <a:rPr lang="en-US" sz="1600" b="1" dirty="0">
+                          <a:solidFill>
+                            <a:schemeClr val="tx1"/>
+                          </a:solidFill>
+                          <a:latin typeface="Courier New" panose="02070309020205020404" pitchFamily="49" charset="0"/>
+                          <a:cs typeface="Courier New" panose="02070309020205020404" pitchFamily="49" charset="0"/>
+                        </a:rPr>
+                        <a:t>(L, 7))</a:t>
+                      </a:r>
+                    </a:p>
+                    <a:p>
+                      <a:r>
+                        <a:rPr lang="en-US" sz="1600" b="1" dirty="0">
+                          <a:solidFill>
+                            <a:schemeClr val="tx1"/>
+                          </a:solidFill>
+                          <a:latin typeface="Courier New" panose="02070309020205020404" pitchFamily="49" charset="0"/>
+                          <a:cs typeface="Courier New" panose="02070309020205020404" pitchFamily="49" charset="0"/>
+                        </a:rPr>
+                        <a:t>print(</a:t>
+                      </a:r>
+                      <a:r>
+                        <a:rPr lang="en-US" sz="1600" b="1" dirty="0" err="1">
+                          <a:solidFill>
+                            <a:srgbClr val="C00000"/>
+                          </a:solidFill>
+                          <a:latin typeface="Courier New" panose="02070309020205020404" pitchFamily="49" charset="0"/>
+                          <a:cs typeface="Courier New" panose="02070309020205020404" pitchFamily="49" charset="0"/>
+                        </a:rPr>
+                        <a:t>bisect_right</a:t>
+                      </a:r>
+                      <a:r>
+                        <a:rPr lang="en-US" sz="1600" b="1" dirty="0">
+                          <a:solidFill>
+                            <a:schemeClr val="tx1"/>
+                          </a:solidFill>
+                          <a:latin typeface="Courier New" panose="02070309020205020404" pitchFamily="49" charset="0"/>
+                          <a:cs typeface="Courier New" panose="02070309020205020404" pitchFamily="49" charset="0"/>
+                        </a:rPr>
+                        <a:t>(L, 7))</a:t>
+                      </a:r>
+                    </a:p>
+                    <a:p>
+                      <a:r>
+                        <a:rPr lang="en-US" sz="1600" b="1" dirty="0">
+                          <a:solidFill>
+                            <a:schemeClr val="tx1"/>
+                          </a:solidFill>
+                          <a:latin typeface="Courier New" panose="02070309020205020404" pitchFamily="49" charset="0"/>
+                          <a:cs typeface="Courier New" panose="02070309020205020404" pitchFamily="49" charset="0"/>
+                        </a:rPr>
+                        <a:t>print(</a:t>
+                      </a:r>
+                      <a:r>
+                        <a:rPr lang="en-US" sz="1600" b="1" dirty="0" err="1">
+                          <a:solidFill>
+                            <a:srgbClr val="C00000"/>
+                          </a:solidFill>
+                          <a:latin typeface="Courier New" panose="02070309020205020404" pitchFamily="49" charset="0"/>
+                          <a:cs typeface="Courier New" panose="02070309020205020404" pitchFamily="49" charset="0"/>
+                        </a:rPr>
+                        <a:t>bisect_left</a:t>
+                      </a:r>
+                      <a:r>
+                        <a:rPr lang="en-US" sz="1600" b="1" dirty="0">
+                          <a:solidFill>
+                            <a:schemeClr val="tx1"/>
+                          </a:solidFill>
+                          <a:latin typeface="Courier New" panose="02070309020205020404" pitchFamily="49" charset="0"/>
+                          <a:cs typeface="Courier New" panose="02070309020205020404" pitchFamily="49" charset="0"/>
+                        </a:rPr>
+                        <a:t>(L, 14))</a:t>
+                      </a:r>
+                    </a:p>
+                    <a:p>
+                      <a:r>
+                        <a:rPr lang="en-US" sz="1600" b="1" dirty="0">
+                          <a:solidFill>
+                            <a:schemeClr val="tx1"/>
+                          </a:solidFill>
+                          <a:latin typeface="Courier New" panose="02070309020205020404" pitchFamily="49" charset="0"/>
+                          <a:cs typeface="Courier New" panose="02070309020205020404" pitchFamily="49" charset="0"/>
+                        </a:rPr>
+                        <a:t>print(</a:t>
+                      </a:r>
+                      <a:r>
+                        <a:rPr lang="en-US" sz="1600" b="1" dirty="0" err="1">
+                          <a:solidFill>
+                            <a:srgbClr val="C00000"/>
+                          </a:solidFill>
+                          <a:latin typeface="Courier New" panose="02070309020205020404" pitchFamily="49" charset="0"/>
+                          <a:cs typeface="Courier New" panose="02070309020205020404" pitchFamily="49" charset="0"/>
+                        </a:rPr>
+                        <a:t>bisect_right</a:t>
+                      </a:r>
+                      <a:r>
+                        <a:rPr lang="en-US" sz="1600" b="1" dirty="0">
+                          <a:solidFill>
+                            <a:schemeClr val="tx1"/>
+                          </a:solidFill>
+                          <a:latin typeface="Courier New" panose="02070309020205020404" pitchFamily="49" charset="0"/>
+                          <a:cs typeface="Courier New" panose="02070309020205020404" pitchFamily="49" charset="0"/>
+                        </a:rPr>
+                        <a:t>(L, 14))</a:t>
+                      </a:r>
+                    </a:p>
+                  </a:txBody>
+                  <a:tcPr>
+                    <a:lnL w="6350" cap="flat" cmpd="sng" algn="ctr">
+                      <a:solidFill>
+                        <a:schemeClr val="tx1"/>
+                      </a:solidFill>
+                      <a:prstDash val="solid"/>
+                      <a:round/>
+                      <a:headEnd type="none" w="med" len="med"/>
+                      <a:tailEnd type="none" w="med" len="med"/>
+                    </a:lnL>
+                    <a:lnR w="6350" cap="flat" cmpd="sng" algn="ctr">
+                      <a:solidFill>
+                        <a:schemeClr val="tx1"/>
+                      </a:solidFill>
+                      <a:prstDash val="solid"/>
+                      <a:round/>
+                      <a:headEnd type="none" w="med" len="med"/>
+                      <a:tailEnd type="none" w="med" len="med"/>
+                    </a:lnR>
+                    <a:lnT w="6350" cap="flat" cmpd="sng" algn="ctr">
+                      <a:solidFill>
+                        <a:schemeClr val="tx1"/>
+                      </a:solidFill>
+                      <a:prstDash val="solid"/>
+                      <a:round/>
+                      <a:headEnd type="none" w="med" len="med"/>
+                      <a:tailEnd type="none" w="med" len="med"/>
+                    </a:lnT>
+                    <a:lnB w="6350" cap="flat" cmpd="sng" algn="ctr">
+                      <a:solidFill>
+                        <a:schemeClr val="tx1"/>
+                      </a:solidFill>
+                      <a:prstDash val="solid"/>
+                      <a:round/>
+                      <a:headEnd type="none" w="med" len="med"/>
+                      <a:tailEnd type="none" w="med" len="med"/>
+                    </a:lnB>
+                    <a:lnTlToBr w="12700" cmpd="sng">
+                      <a:noFill/>
+                      <a:prstDash val="solid"/>
+                    </a:lnTlToBr>
+                    <a:lnBlToTr w="12700" cmpd="sng">
+                      <a:noFill/>
+                      <a:prstDash val="solid"/>
+                    </a:lnBlToTr>
+                    <a:solidFill>
+                      <a:schemeClr val="accent5">
+                        <a:lumMod val="20000"/>
+                        <a:lumOff val="80000"/>
+                      </a:schemeClr>
+                    </a:solidFill>
+                  </a:tcPr>
+                </a:tc>
+                <a:extLst>
+                  <a:ext uri="{0D108BD9-81ED-4DB2-BD59-A6C34878D82A}">
+                    <a16:rowId xmlns:a16="http://schemas.microsoft.com/office/drawing/2014/main" val="4112970457"/>
+                  </a:ext>
+                </a:extLst>
+              </a:tr>
+              <a:tr h="179367">
+                <a:tc>
+                  <a:txBody>
+                    <a:bodyPr/>
+                    <a:lstStyle/>
+                    <a:p>
+                      <a:r>
+                        <a:rPr lang="pt-BR" sz="1600" b="1" dirty="0">
+                          <a:solidFill>
+                            <a:schemeClr val="bg1"/>
+                          </a:solidFill>
+                          <a:latin typeface="Courier New" panose="02070309020205020404" pitchFamily="49" charset="0"/>
+                          <a:cs typeface="Courier New" panose="02070309020205020404" pitchFamily="49" charset="0"/>
+                        </a:rPr>
+                        <a:t>Python shell</a:t>
+                      </a:r>
+                    </a:p>
+                  </a:txBody>
+                  <a:tcPr>
+                    <a:lnL w="6350" cap="flat" cmpd="sng" algn="ctr">
+                      <a:solidFill>
+                        <a:schemeClr val="tx1"/>
+                      </a:solidFill>
+                      <a:prstDash val="solid"/>
+                      <a:round/>
+                      <a:headEnd type="none" w="med" len="med"/>
+                      <a:tailEnd type="none" w="med" len="med"/>
+                    </a:lnL>
+                    <a:lnR w="6350" cap="flat" cmpd="sng" algn="ctr">
+                      <a:solidFill>
+                        <a:schemeClr val="tx1"/>
+                      </a:solidFill>
+                      <a:prstDash val="solid"/>
+                      <a:round/>
+                      <a:headEnd type="none" w="med" len="med"/>
+                      <a:tailEnd type="none" w="med" len="med"/>
+                    </a:lnR>
+                    <a:lnT w="6350" cap="flat" cmpd="sng" algn="ctr">
+                      <a:solidFill>
+                        <a:schemeClr val="tx1"/>
+                      </a:solidFill>
+                      <a:prstDash val="solid"/>
+                      <a:round/>
+                      <a:headEnd type="none" w="med" len="med"/>
+                      <a:tailEnd type="none" w="med" len="med"/>
+                    </a:lnT>
+                    <a:lnB w="6350" cap="flat" cmpd="sng" algn="ctr">
+                      <a:solidFill>
+                        <a:schemeClr val="tx1"/>
+                      </a:solidFill>
+                      <a:prstDash val="solid"/>
+                      <a:round/>
+                      <a:headEnd type="none" w="med" len="med"/>
+                      <a:tailEnd type="none" w="med" len="med"/>
+                    </a:lnB>
+                    <a:lnTlToBr w="12700" cmpd="sng">
+                      <a:noFill/>
+                      <a:prstDash val="solid"/>
+                    </a:lnTlToBr>
+                    <a:lnBlToTr w="12700" cmpd="sng">
+                      <a:noFill/>
+                      <a:prstDash val="solid"/>
+                    </a:lnBlToTr>
+                    <a:solidFill>
+                      <a:srgbClr val="C00000"/>
+                    </a:solidFill>
+                  </a:tcPr>
+                </a:tc>
+                <a:extLst>
+                  <a:ext uri="{0D108BD9-81ED-4DB2-BD59-A6C34878D82A}">
+                    <a16:rowId xmlns:a16="http://schemas.microsoft.com/office/drawing/2014/main" val="3167765046"/>
+                  </a:ext>
+                </a:extLst>
+              </a:tr>
+              <a:tr h="505989">
+                <a:tc>
+                  <a:txBody>
+                    <a:bodyPr/>
+                    <a:lstStyle/>
+                    <a:p>
+                      <a:pPr marL="266700" marR="0" lvl="0" indent="-266700" algn="l" defTabSz="914400" rtl="0" eaLnBrk="1" fontAlgn="auto" latinLnBrk="0" hangingPunct="1">
+                        <a:lnSpc>
+                          <a:spcPct val="100000"/>
+                        </a:lnSpc>
+                        <a:spcBef>
+                          <a:spcPts val="0"/>
+                        </a:spcBef>
+                        <a:spcAft>
+                          <a:spcPts val="0"/>
+                        </a:spcAft>
+                        <a:buClr>
+                          <a:schemeClr val="accent1">
+                            <a:lumMod val="50000"/>
+                          </a:schemeClr>
+                        </a:buClr>
+                        <a:buSzPct val="120000"/>
+                        <a:buFont typeface="Courier New" panose="02070309020205020404" pitchFamily="49" charset="0"/>
+                        <a:buChar char="|"/>
+                        <a:tabLst/>
+                        <a:defRPr/>
+                      </a:pPr>
+                      <a:r>
+                        <a:rPr lang="en-US" sz="1600" b="1" dirty="0">
+                          <a:latin typeface="Courier New" panose="02070309020205020404" pitchFamily="49" charset="0"/>
+                          <a:cs typeface="Courier New" panose="02070309020205020404" pitchFamily="49" charset="0"/>
+                        </a:rPr>
+                        <a:t>3  </a:t>
+                      </a:r>
+                      <a:r>
+                        <a:rPr lang="en-US" sz="1600" b="1" i="1" dirty="0">
+                          <a:solidFill>
+                            <a:schemeClr val="bg1">
+                              <a:lumMod val="50000"/>
+                            </a:schemeClr>
+                          </a:solidFill>
+                          <a:latin typeface="Courier New" panose="02070309020205020404" pitchFamily="49" charset="0"/>
+                          <a:cs typeface="Courier New" panose="02070309020205020404" pitchFamily="49" charset="0"/>
+                        </a:rPr>
+                        <a:t># </a:t>
+                      </a:r>
+                      <a:r>
+                        <a:rPr lang="en-US" sz="1600" b="1" i="1" dirty="0" err="1">
+                          <a:solidFill>
+                            <a:schemeClr val="bg1">
+                              <a:lumMod val="50000"/>
+                            </a:schemeClr>
+                          </a:solidFill>
+                          <a:latin typeface="Courier New" panose="02070309020205020404" pitchFamily="49" charset="0"/>
+                          <a:cs typeface="Courier New" panose="02070309020205020404" pitchFamily="49" charset="0"/>
+                        </a:rPr>
+                        <a:t>bisect_left</a:t>
+                      </a:r>
+                      <a:r>
+                        <a:rPr lang="en-US" sz="1600" b="1" i="1" dirty="0">
+                          <a:solidFill>
+                            <a:schemeClr val="bg1">
+                              <a:lumMod val="50000"/>
+                            </a:schemeClr>
+                          </a:solidFill>
+                          <a:latin typeface="Courier New" panose="02070309020205020404" pitchFamily="49" charset="0"/>
+                          <a:cs typeface="Courier New" panose="02070309020205020404" pitchFamily="49" charset="0"/>
+                        </a:rPr>
+                        <a:t>(L, 7)</a:t>
+                      </a:r>
+                    </a:p>
+                    <a:p>
+                      <a:pPr marL="266700" marR="0" lvl="0" indent="-266700" algn="l" defTabSz="914400" rtl="0" eaLnBrk="1" fontAlgn="auto" latinLnBrk="0" hangingPunct="1">
+                        <a:lnSpc>
+                          <a:spcPct val="100000"/>
+                        </a:lnSpc>
+                        <a:spcBef>
+                          <a:spcPts val="0"/>
+                        </a:spcBef>
+                        <a:spcAft>
+                          <a:spcPts val="0"/>
+                        </a:spcAft>
+                        <a:buClr>
+                          <a:schemeClr val="accent1">
+                            <a:lumMod val="50000"/>
+                          </a:schemeClr>
+                        </a:buClr>
+                        <a:buSzPct val="120000"/>
+                        <a:buFont typeface="Courier New" panose="02070309020205020404" pitchFamily="49" charset="0"/>
+                        <a:buChar char="|"/>
+                        <a:tabLst/>
+                        <a:defRPr/>
+                      </a:pPr>
+                      <a:r>
+                        <a:rPr lang="en-US" sz="1600" b="1" dirty="0">
+                          <a:latin typeface="Courier New" panose="02070309020205020404" pitchFamily="49" charset="0"/>
+                          <a:cs typeface="Courier New" panose="02070309020205020404" pitchFamily="49" charset="0"/>
+                        </a:rPr>
+                        <a:t>6  </a:t>
+                      </a:r>
+                      <a:r>
+                        <a:rPr lang="en-US" sz="1600" b="1" i="1" dirty="0">
+                          <a:solidFill>
+                            <a:schemeClr val="bg1">
+                              <a:lumMod val="50000"/>
+                            </a:schemeClr>
+                          </a:solidFill>
+                          <a:latin typeface="Courier New" panose="02070309020205020404" pitchFamily="49" charset="0"/>
+                          <a:cs typeface="Courier New" panose="02070309020205020404" pitchFamily="49" charset="0"/>
+                        </a:rPr>
+                        <a:t># </a:t>
+                      </a:r>
+                      <a:r>
+                        <a:rPr lang="en-US" sz="1600" b="1" i="1" dirty="0" err="1">
+                          <a:solidFill>
+                            <a:schemeClr val="bg1">
+                              <a:lumMod val="50000"/>
+                            </a:schemeClr>
+                          </a:solidFill>
+                          <a:latin typeface="Courier New" panose="02070309020205020404" pitchFamily="49" charset="0"/>
+                          <a:cs typeface="Courier New" panose="02070309020205020404" pitchFamily="49" charset="0"/>
+                        </a:rPr>
+                        <a:t>bisect_right</a:t>
+                      </a:r>
+                      <a:r>
+                        <a:rPr lang="en-US" sz="1600" b="1" i="1" dirty="0">
+                          <a:solidFill>
+                            <a:schemeClr val="bg1">
+                              <a:lumMod val="50000"/>
+                            </a:schemeClr>
+                          </a:solidFill>
+                          <a:latin typeface="Courier New" panose="02070309020205020404" pitchFamily="49" charset="0"/>
+                          <a:cs typeface="Courier New" panose="02070309020205020404" pitchFamily="49" charset="0"/>
+                        </a:rPr>
+                        <a:t>(L, 7)</a:t>
+                      </a:r>
+                      <a:endParaRPr lang="en-US" sz="1600" b="1" dirty="0">
+                        <a:latin typeface="Courier New" panose="02070309020205020404" pitchFamily="49" charset="0"/>
+                        <a:cs typeface="Courier New" panose="02070309020205020404" pitchFamily="49" charset="0"/>
+                      </a:endParaRPr>
+                    </a:p>
+                    <a:p>
+                      <a:pPr marL="266700" marR="0" lvl="0" indent="-266700" algn="l" defTabSz="914400" rtl="0" eaLnBrk="1" fontAlgn="auto" latinLnBrk="0" hangingPunct="1">
+                        <a:lnSpc>
+                          <a:spcPct val="100000"/>
+                        </a:lnSpc>
+                        <a:spcBef>
+                          <a:spcPts val="0"/>
+                        </a:spcBef>
+                        <a:spcAft>
+                          <a:spcPts val="0"/>
+                        </a:spcAft>
+                        <a:buClr>
+                          <a:schemeClr val="accent1">
+                            <a:lumMod val="50000"/>
+                          </a:schemeClr>
+                        </a:buClr>
+                        <a:buSzPct val="120000"/>
+                        <a:buFont typeface="Courier New" panose="02070309020205020404" pitchFamily="49" charset="0"/>
+                        <a:buChar char="|"/>
+                        <a:tabLst/>
+                        <a:defRPr/>
+                      </a:pPr>
+                      <a:r>
+                        <a:rPr lang="en-US" sz="1600" b="1" dirty="0">
+                          <a:latin typeface="Courier New" panose="02070309020205020404" pitchFamily="49" charset="0"/>
+                          <a:cs typeface="Courier New" panose="02070309020205020404" pitchFamily="49" charset="0"/>
+                        </a:rPr>
+                        <a:t>9  </a:t>
+                      </a:r>
+                      <a:r>
+                        <a:rPr lang="en-US" sz="1600" b="1" i="1" dirty="0">
+                          <a:solidFill>
+                            <a:schemeClr val="bg1">
+                              <a:lumMod val="50000"/>
+                            </a:schemeClr>
+                          </a:solidFill>
+                          <a:latin typeface="Courier New" panose="02070309020205020404" pitchFamily="49" charset="0"/>
+                          <a:cs typeface="Courier New" panose="02070309020205020404" pitchFamily="49" charset="0"/>
+                        </a:rPr>
+                        <a:t># </a:t>
+                      </a:r>
+                      <a:r>
+                        <a:rPr lang="en-US" sz="1600" b="1" i="1" dirty="0" err="1">
+                          <a:solidFill>
+                            <a:schemeClr val="bg1">
+                              <a:lumMod val="50000"/>
+                            </a:schemeClr>
+                          </a:solidFill>
+                          <a:latin typeface="Courier New" panose="02070309020205020404" pitchFamily="49" charset="0"/>
+                          <a:cs typeface="Courier New" panose="02070309020205020404" pitchFamily="49" charset="0"/>
+                        </a:rPr>
+                        <a:t>bisect_left</a:t>
+                      </a:r>
+                      <a:r>
+                        <a:rPr lang="en-US" sz="1600" b="1" i="1" dirty="0">
+                          <a:solidFill>
+                            <a:schemeClr val="bg1">
+                              <a:lumMod val="50000"/>
+                            </a:schemeClr>
+                          </a:solidFill>
+                          <a:latin typeface="Courier New" panose="02070309020205020404" pitchFamily="49" charset="0"/>
+                          <a:cs typeface="Courier New" panose="02070309020205020404" pitchFamily="49" charset="0"/>
+                        </a:rPr>
+                        <a:t>(L, 14)</a:t>
+                      </a:r>
+                      <a:endParaRPr lang="en-US" sz="1600" b="1" dirty="0">
+                        <a:latin typeface="Courier New" panose="02070309020205020404" pitchFamily="49" charset="0"/>
+                        <a:cs typeface="Courier New" panose="02070309020205020404" pitchFamily="49" charset="0"/>
+                      </a:endParaRPr>
+                    </a:p>
+                    <a:p>
+                      <a:pPr marL="266700" marR="0" lvl="0" indent="-266700" algn="l" defTabSz="914400" rtl="0" eaLnBrk="1" fontAlgn="auto" latinLnBrk="0" hangingPunct="1">
+                        <a:lnSpc>
+                          <a:spcPct val="100000"/>
+                        </a:lnSpc>
+                        <a:spcBef>
+                          <a:spcPts val="0"/>
+                        </a:spcBef>
+                        <a:spcAft>
+                          <a:spcPts val="0"/>
+                        </a:spcAft>
+                        <a:buClr>
+                          <a:schemeClr val="accent1">
+                            <a:lumMod val="50000"/>
+                          </a:schemeClr>
+                        </a:buClr>
+                        <a:buSzPct val="120000"/>
+                        <a:buFont typeface="Courier New" panose="02070309020205020404" pitchFamily="49" charset="0"/>
+                        <a:buChar char="|"/>
+                        <a:tabLst/>
+                        <a:defRPr/>
+                      </a:pPr>
+                      <a:r>
+                        <a:rPr lang="en-US" sz="1600" b="1" dirty="0">
+                          <a:latin typeface="Courier New" panose="02070309020205020404" pitchFamily="49" charset="0"/>
+                          <a:cs typeface="Courier New" panose="02070309020205020404" pitchFamily="49" charset="0"/>
+                        </a:rPr>
+                        <a:t>9  </a:t>
+                      </a:r>
+                      <a:r>
+                        <a:rPr lang="en-US" sz="1600" b="1" i="1" dirty="0">
+                          <a:solidFill>
+                            <a:schemeClr val="bg1">
+                              <a:lumMod val="50000"/>
+                            </a:schemeClr>
+                          </a:solidFill>
+                          <a:latin typeface="Courier New" panose="02070309020205020404" pitchFamily="49" charset="0"/>
+                          <a:cs typeface="Courier New" panose="02070309020205020404" pitchFamily="49" charset="0"/>
+                        </a:rPr>
+                        <a:t># </a:t>
+                      </a:r>
+                      <a:r>
+                        <a:rPr lang="en-US" sz="1600" b="1" i="1" dirty="0" err="1">
+                          <a:solidFill>
+                            <a:schemeClr val="bg1">
+                              <a:lumMod val="50000"/>
+                            </a:schemeClr>
+                          </a:solidFill>
+                          <a:latin typeface="Courier New" panose="02070309020205020404" pitchFamily="49" charset="0"/>
+                          <a:cs typeface="Courier New" panose="02070309020205020404" pitchFamily="49" charset="0"/>
+                        </a:rPr>
+                        <a:t>bisect_right</a:t>
+                      </a:r>
+                      <a:r>
+                        <a:rPr lang="en-US" sz="1600" b="1" i="1" dirty="0">
+                          <a:solidFill>
+                            <a:schemeClr val="bg1">
+                              <a:lumMod val="50000"/>
+                            </a:schemeClr>
+                          </a:solidFill>
+                          <a:latin typeface="Courier New" panose="02070309020205020404" pitchFamily="49" charset="0"/>
+                          <a:cs typeface="Courier New" panose="02070309020205020404" pitchFamily="49" charset="0"/>
+                        </a:rPr>
+                        <a:t>(L, 14)</a:t>
+                      </a:r>
+                      <a:r>
+                        <a:rPr lang="en-US" sz="1600" b="1" dirty="0">
+                          <a:latin typeface="Courier New" panose="02070309020205020404" pitchFamily="49" charset="0"/>
+                          <a:cs typeface="Courier New" panose="02070309020205020404" pitchFamily="49" charset="0"/>
+                        </a:rPr>
+                        <a:t>  </a:t>
+                      </a:r>
+                      <a:endParaRPr lang="en-US" sz="1200" b="1" dirty="0">
+                        <a:solidFill>
+                          <a:srgbClr val="C00000"/>
+                        </a:solidFill>
+                        <a:latin typeface="Courier New" panose="02070309020205020404" pitchFamily="49" charset="0"/>
+                        <a:cs typeface="Courier New" panose="02070309020205020404" pitchFamily="49" charset="0"/>
+                      </a:endParaRPr>
+                    </a:p>
+                  </a:txBody>
+                  <a:tcPr>
+                    <a:lnL w="6350" cap="flat" cmpd="sng" algn="ctr">
+                      <a:solidFill>
+                        <a:schemeClr val="tx1"/>
+                      </a:solidFill>
+                      <a:prstDash val="solid"/>
+                      <a:round/>
+                      <a:headEnd type="none" w="med" len="med"/>
+                      <a:tailEnd type="none" w="med" len="med"/>
+                    </a:lnL>
+                    <a:lnR w="6350" cap="flat" cmpd="sng" algn="ctr">
+                      <a:solidFill>
+                        <a:schemeClr val="tx1"/>
+                      </a:solidFill>
+                      <a:prstDash val="solid"/>
+                      <a:round/>
+                      <a:headEnd type="none" w="med" len="med"/>
+                      <a:tailEnd type="none" w="med" len="med"/>
+                    </a:lnR>
+                    <a:lnT w="6350" cap="flat" cmpd="sng" algn="ctr">
+                      <a:solidFill>
+                        <a:schemeClr val="tx1"/>
+                      </a:solidFill>
+                      <a:prstDash val="solid"/>
+                      <a:round/>
+                      <a:headEnd type="none" w="med" len="med"/>
+                      <a:tailEnd type="none" w="med" len="med"/>
+                    </a:lnT>
+                    <a:lnB w="6350" cap="flat" cmpd="sng" algn="ctr">
+                      <a:solidFill>
+                        <a:schemeClr val="tx1"/>
+                      </a:solidFill>
+                      <a:prstDash val="solid"/>
+                      <a:round/>
+                      <a:headEnd type="none" w="med" len="med"/>
+                      <a:tailEnd type="none" w="med" len="med"/>
+                    </a:lnB>
+                    <a:lnTlToBr w="12700" cmpd="sng">
+                      <a:noFill/>
+                      <a:prstDash val="solid"/>
+                    </a:lnTlToBr>
+                    <a:lnBlToTr w="12700" cmpd="sng">
+                      <a:noFill/>
+                      <a:prstDash val="solid"/>
+                    </a:lnBlToTr>
+                    <a:solidFill>
+                      <a:schemeClr val="accent5">
+                        <a:lumMod val="20000"/>
+                        <a:lumOff val="80000"/>
+                      </a:schemeClr>
+                    </a:solidFill>
+                  </a:tcPr>
+                </a:tc>
+                <a:extLst>
+                  <a:ext uri="{0D108BD9-81ED-4DB2-BD59-A6C34878D82A}">
+                    <a16:rowId xmlns:a16="http://schemas.microsoft.com/office/drawing/2014/main" val="4204568129"/>
+                  </a:ext>
+                </a:extLst>
+              </a:tr>
+            </a:tbl>
+          </a:graphicData>
+        </a:graphic>
+      </p:graphicFrame>
+      <p:graphicFrame>
+        <p:nvGraphicFramePr>
+          <p:cNvPr id="12" name="Table 11">
+            <a:extLst>
+              <a:ext uri="{FF2B5EF4-FFF2-40B4-BE49-F238E27FC236}">
+                <a16:creationId xmlns:a16="http://schemas.microsoft.com/office/drawing/2014/main" id="{49CAE249-0CFD-66AD-BC65-DF4033B6C043}"/>
+              </a:ext>
+            </a:extLst>
+          </p:cNvPr>
+          <p:cNvGraphicFramePr>
+            <a:graphicFrameLocks noGrp="1"/>
+          </p:cNvGraphicFramePr>
+          <p:nvPr>
+            <p:extLst>
+              <p:ext uri="{D42A27DB-BD31-4B8C-83A1-F6EECF244321}">
+                <p14:modId xmlns:p14="http://schemas.microsoft.com/office/powerpoint/2010/main" val="2210068799"/>
+              </p:ext>
+            </p:extLst>
+          </p:nvPr>
+        </p:nvGraphicFramePr>
+        <p:xfrm>
+          <a:off x="1514954" y="5751195"/>
+          <a:ext cx="7059448" cy="741680"/>
+        </p:xfrm>
+        <a:graphic>
+          <a:graphicData uri="http://schemas.openxmlformats.org/drawingml/2006/table">
+            <a:tbl>
+              <a:tblPr firstRow="1" bandRow="1">
+                <a:tableStyleId>{2D5ABB26-0587-4C30-8999-92F81FD0307C}</a:tableStyleId>
+              </a:tblPr>
+              <a:tblGrid>
+                <a:gridCol w="641768">
+                  <a:extLst>
+                    <a:ext uri="{9D8B030D-6E8A-4147-A177-3AD203B41FA5}">
+                      <a16:colId xmlns:a16="http://schemas.microsoft.com/office/drawing/2014/main" val="3821525899"/>
+                    </a:ext>
+                  </a:extLst>
+                </a:gridCol>
+                <a:gridCol w="641768">
+                  <a:extLst>
+                    <a:ext uri="{9D8B030D-6E8A-4147-A177-3AD203B41FA5}">
+                      <a16:colId xmlns:a16="http://schemas.microsoft.com/office/drawing/2014/main" val="3855207571"/>
+                    </a:ext>
+                  </a:extLst>
+                </a:gridCol>
+                <a:gridCol w="641768">
+                  <a:extLst>
+                    <a:ext uri="{9D8B030D-6E8A-4147-A177-3AD203B41FA5}">
+                      <a16:colId xmlns:a16="http://schemas.microsoft.com/office/drawing/2014/main" val="4079671559"/>
+                    </a:ext>
+                  </a:extLst>
+                </a:gridCol>
+                <a:gridCol w="641768">
+                  <a:extLst>
+                    <a:ext uri="{9D8B030D-6E8A-4147-A177-3AD203B41FA5}">
+                      <a16:colId xmlns:a16="http://schemas.microsoft.com/office/drawing/2014/main" val="1480018592"/>
+                    </a:ext>
+                  </a:extLst>
+                </a:gridCol>
+                <a:gridCol w="641768">
+                  <a:extLst>
+                    <a:ext uri="{9D8B030D-6E8A-4147-A177-3AD203B41FA5}">
+                      <a16:colId xmlns:a16="http://schemas.microsoft.com/office/drawing/2014/main" val="3417030530"/>
+                    </a:ext>
+                  </a:extLst>
+                </a:gridCol>
+                <a:gridCol w="641768">
+                  <a:extLst>
+                    <a:ext uri="{9D8B030D-6E8A-4147-A177-3AD203B41FA5}">
+                      <a16:colId xmlns:a16="http://schemas.microsoft.com/office/drawing/2014/main" val="382049569"/>
+                    </a:ext>
+                  </a:extLst>
+                </a:gridCol>
+                <a:gridCol w="641768">
+                  <a:extLst>
+                    <a:ext uri="{9D8B030D-6E8A-4147-A177-3AD203B41FA5}">
+                      <a16:colId xmlns:a16="http://schemas.microsoft.com/office/drawing/2014/main" val="260403653"/>
+                    </a:ext>
+                  </a:extLst>
+                </a:gridCol>
+                <a:gridCol w="641768">
+                  <a:extLst>
+                    <a:ext uri="{9D8B030D-6E8A-4147-A177-3AD203B41FA5}">
+                      <a16:colId xmlns:a16="http://schemas.microsoft.com/office/drawing/2014/main" val="2880502377"/>
+                    </a:ext>
+                  </a:extLst>
+                </a:gridCol>
+                <a:gridCol w="641768">
+                  <a:extLst>
+                    <a:ext uri="{9D8B030D-6E8A-4147-A177-3AD203B41FA5}">
+                      <a16:colId xmlns:a16="http://schemas.microsoft.com/office/drawing/2014/main" val="927707823"/>
+                    </a:ext>
+                  </a:extLst>
+                </a:gridCol>
+                <a:gridCol w="641768">
+                  <a:extLst>
+                    <a:ext uri="{9D8B030D-6E8A-4147-A177-3AD203B41FA5}">
+                      <a16:colId xmlns:a16="http://schemas.microsoft.com/office/drawing/2014/main" val="874554756"/>
+                    </a:ext>
+                  </a:extLst>
+                </a:gridCol>
+                <a:gridCol w="641768">
+                  <a:extLst>
+                    <a:ext uri="{9D8B030D-6E8A-4147-A177-3AD203B41FA5}">
+                      <a16:colId xmlns:a16="http://schemas.microsoft.com/office/drawing/2014/main" val="1686187145"/>
+                    </a:ext>
+                  </a:extLst>
+                </a:gridCol>
+              </a:tblGrid>
+              <a:tr h="370840">
+                <a:tc>
+                  <a:txBody>
+                    <a:bodyPr/>
+                    <a:lstStyle/>
+                    <a:p>
+                      <a:pPr algn="ctr"/>
+                      <a:r>
+                        <a:rPr lang="da-DK" sz="1200" dirty="0"/>
+                        <a:t>0</a:t>
+                      </a:r>
+                      <a:endParaRPr lang="en-US" sz="1200" dirty="0"/>
+                    </a:p>
+                  </a:txBody>
+                  <a:tcPr anchor="b">
+                    <a:lnB w="12700" cap="flat" cmpd="sng" algn="ctr">
+                      <a:solidFill>
+                        <a:schemeClr val="tx1"/>
+                      </a:solidFill>
+                      <a:prstDash val="solid"/>
+                      <a:round/>
+                      <a:headEnd type="none" w="med" len="med"/>
+                      <a:tailEnd type="none" w="med" len="med"/>
+                    </a:lnB>
+                  </a:tcPr>
+                </a:tc>
+                <a:tc>
+                  <a:txBody>
+                    <a:bodyPr/>
+                    <a:lstStyle/>
+                    <a:p>
+                      <a:pPr algn="ctr"/>
+                      <a:r>
+                        <a:rPr lang="da-DK" sz="1200" dirty="0"/>
+                        <a:t>1</a:t>
+                      </a:r>
+                      <a:endParaRPr lang="en-US" sz="1200" dirty="0"/>
+                    </a:p>
+                  </a:txBody>
+                  <a:tcPr anchor="b">
+                    <a:lnB w="12700" cap="flat" cmpd="sng" algn="ctr">
+                      <a:solidFill>
+                        <a:schemeClr val="tx1"/>
+                      </a:solidFill>
+                      <a:prstDash val="solid"/>
+                      <a:round/>
+                      <a:headEnd type="none" w="med" len="med"/>
+                      <a:tailEnd type="none" w="med" len="med"/>
+                    </a:lnB>
+                  </a:tcPr>
+                </a:tc>
+                <a:tc>
+                  <a:txBody>
+                    <a:bodyPr/>
+                    <a:lstStyle/>
+                    <a:p>
+                      <a:pPr algn="ctr"/>
+                      <a:r>
+                        <a:rPr lang="da-DK" sz="1200" dirty="0"/>
+                        <a:t>2</a:t>
+                      </a:r>
+                      <a:endParaRPr lang="en-US" sz="1200" dirty="0"/>
+                    </a:p>
+                  </a:txBody>
+                  <a:tcPr anchor="b">
+                    <a:lnB w="12700" cap="flat" cmpd="sng" algn="ctr">
+                      <a:solidFill>
+                        <a:schemeClr val="tx1"/>
+                      </a:solidFill>
+                      <a:prstDash val="solid"/>
+                      <a:round/>
+                      <a:headEnd type="none" w="med" len="med"/>
+                      <a:tailEnd type="none" w="med" len="med"/>
+                    </a:lnB>
+                  </a:tcPr>
+                </a:tc>
+                <a:tc>
+                  <a:txBody>
+                    <a:bodyPr/>
+                    <a:lstStyle/>
+                    <a:p>
+                      <a:pPr algn="ctr"/>
+                      <a:r>
+                        <a:rPr lang="da-DK" sz="1200" dirty="0"/>
+                        <a:t>3</a:t>
+                      </a:r>
+                      <a:endParaRPr lang="en-US" sz="1200" dirty="0"/>
+                    </a:p>
+                  </a:txBody>
+                  <a:tcPr anchor="b">
+                    <a:lnB w="12700" cap="flat" cmpd="sng" algn="ctr">
+                      <a:solidFill>
+                        <a:schemeClr val="tx1"/>
+                      </a:solidFill>
+                      <a:prstDash val="solid"/>
+                      <a:round/>
+                      <a:headEnd type="none" w="med" len="med"/>
+                      <a:tailEnd type="none" w="med" len="med"/>
+                    </a:lnB>
+                  </a:tcPr>
+                </a:tc>
+                <a:tc>
+                  <a:txBody>
+                    <a:bodyPr/>
+                    <a:lstStyle/>
+                    <a:p>
+                      <a:pPr algn="ctr"/>
+                      <a:r>
+                        <a:rPr lang="da-DK" sz="1200" dirty="0"/>
+                        <a:t>4</a:t>
+                      </a:r>
+                      <a:endParaRPr lang="en-US" sz="1200" dirty="0"/>
+                    </a:p>
+                  </a:txBody>
+                  <a:tcPr anchor="b">
+                    <a:lnB w="12700" cap="flat" cmpd="sng" algn="ctr">
+                      <a:solidFill>
+                        <a:schemeClr val="tx1"/>
+                      </a:solidFill>
+                      <a:prstDash val="solid"/>
+                      <a:round/>
+                      <a:headEnd type="none" w="med" len="med"/>
+                      <a:tailEnd type="none" w="med" len="med"/>
+                    </a:lnB>
+                  </a:tcPr>
+                </a:tc>
+                <a:tc>
+                  <a:txBody>
+                    <a:bodyPr/>
+                    <a:lstStyle/>
+                    <a:p>
+                      <a:pPr algn="ctr"/>
+                      <a:r>
+                        <a:rPr lang="da-DK" sz="1200" dirty="0"/>
+                        <a:t>5</a:t>
+                      </a:r>
+                      <a:endParaRPr lang="en-US" sz="1200" dirty="0"/>
+                    </a:p>
+                  </a:txBody>
+                  <a:tcPr anchor="b">
+                    <a:lnB w="12700" cap="flat" cmpd="sng" algn="ctr">
+                      <a:solidFill>
+                        <a:schemeClr val="tx1"/>
+                      </a:solidFill>
+                      <a:prstDash val="solid"/>
+                      <a:round/>
+                      <a:headEnd type="none" w="med" len="med"/>
+                      <a:tailEnd type="none" w="med" len="med"/>
+                    </a:lnB>
+                  </a:tcPr>
+                </a:tc>
+                <a:tc>
+                  <a:txBody>
+                    <a:bodyPr/>
+                    <a:lstStyle/>
+                    <a:p>
+                      <a:pPr algn="ctr"/>
+                      <a:r>
+                        <a:rPr lang="da-DK" sz="1200" dirty="0"/>
+                        <a:t>6</a:t>
+                      </a:r>
+                      <a:endParaRPr lang="en-US" sz="1200" dirty="0"/>
+                    </a:p>
+                  </a:txBody>
+                  <a:tcPr anchor="b">
+                    <a:lnB w="12700" cap="flat" cmpd="sng" algn="ctr">
+                      <a:solidFill>
+                        <a:schemeClr val="tx1"/>
+                      </a:solidFill>
+                      <a:prstDash val="solid"/>
+                      <a:round/>
+                      <a:headEnd type="none" w="med" len="med"/>
+                      <a:tailEnd type="none" w="med" len="med"/>
+                    </a:lnB>
+                  </a:tcPr>
+                </a:tc>
+                <a:tc>
+                  <a:txBody>
+                    <a:bodyPr/>
+                    <a:lstStyle/>
+                    <a:p>
+                      <a:pPr algn="ctr"/>
+                      <a:r>
+                        <a:rPr lang="da-DK" sz="1200" dirty="0"/>
+                        <a:t>7</a:t>
+                      </a:r>
+                      <a:endParaRPr lang="en-US" sz="1200" dirty="0"/>
+                    </a:p>
+                  </a:txBody>
+                  <a:tcPr anchor="b">
+                    <a:lnB w="12700" cap="flat" cmpd="sng" algn="ctr">
+                      <a:solidFill>
+                        <a:schemeClr val="tx1"/>
+                      </a:solidFill>
+                      <a:prstDash val="solid"/>
+                      <a:round/>
+                      <a:headEnd type="none" w="med" len="med"/>
+                      <a:tailEnd type="none" w="med" len="med"/>
+                    </a:lnB>
+                  </a:tcPr>
+                </a:tc>
+                <a:tc>
+                  <a:txBody>
+                    <a:bodyPr/>
+                    <a:lstStyle/>
+                    <a:p>
+                      <a:pPr algn="ctr"/>
+                      <a:r>
+                        <a:rPr lang="da-DK" sz="1200" dirty="0"/>
+                        <a:t>8</a:t>
+                      </a:r>
+                      <a:endParaRPr lang="en-US" sz="1200" dirty="0"/>
+                    </a:p>
+                  </a:txBody>
+                  <a:tcPr anchor="b">
+                    <a:lnB w="12700" cap="flat" cmpd="sng" algn="ctr">
+                      <a:solidFill>
+                        <a:schemeClr val="tx1"/>
+                      </a:solidFill>
+                      <a:prstDash val="solid"/>
+                      <a:round/>
+                      <a:headEnd type="none" w="med" len="med"/>
+                      <a:tailEnd type="none" w="med" len="med"/>
+                    </a:lnB>
+                  </a:tcPr>
+                </a:tc>
+                <a:tc>
+                  <a:txBody>
+                    <a:bodyPr/>
+                    <a:lstStyle/>
+                    <a:p>
+                      <a:pPr algn="ctr"/>
+                      <a:r>
+                        <a:rPr lang="da-DK" sz="1200" dirty="0"/>
+                        <a:t>9</a:t>
+                      </a:r>
+                      <a:endParaRPr lang="en-US" sz="1200" dirty="0"/>
+                    </a:p>
+                  </a:txBody>
+                  <a:tcPr anchor="b">
+                    <a:lnB w="12700" cap="flat" cmpd="sng" algn="ctr">
+                      <a:solidFill>
+                        <a:schemeClr val="tx1"/>
+                      </a:solidFill>
+                      <a:prstDash val="solid"/>
+                      <a:round/>
+                      <a:headEnd type="none" w="med" len="med"/>
+                      <a:tailEnd type="none" w="med" len="med"/>
+                    </a:lnB>
+                  </a:tcPr>
+                </a:tc>
+                <a:tc>
+                  <a:txBody>
+                    <a:bodyPr/>
+                    <a:lstStyle/>
+                    <a:p>
+                      <a:pPr algn="ctr"/>
+                      <a:r>
+                        <a:rPr lang="da-DK" sz="1200" dirty="0"/>
+                        <a:t>10</a:t>
+                      </a:r>
+                      <a:endParaRPr lang="en-US" sz="1200" dirty="0"/>
+                    </a:p>
+                  </a:txBody>
+                  <a:tcPr anchor="b">
+                    <a:lnB w="12700" cap="flat" cmpd="sng" algn="ctr">
+                      <a:solidFill>
+                        <a:schemeClr val="tx1"/>
+                      </a:solidFill>
+                      <a:prstDash val="solid"/>
+                      <a:round/>
+                      <a:headEnd type="none" w="med" len="med"/>
+                      <a:tailEnd type="none" w="med" len="med"/>
+                    </a:lnB>
+                  </a:tcPr>
+                </a:tc>
+                <a:extLst>
+                  <a:ext uri="{0D108BD9-81ED-4DB2-BD59-A6C34878D82A}">
+                    <a16:rowId xmlns:a16="http://schemas.microsoft.com/office/drawing/2014/main" val="523261560"/>
+                  </a:ext>
+                </a:extLst>
+              </a:tr>
+              <a:tr h="370840">
+                <a:tc>
+                  <a:txBody>
+                    <a:bodyPr/>
+                    <a:lstStyle/>
+                    <a:p>
+                      <a:pPr algn="ctr"/>
+                      <a:r>
+                        <a:rPr lang="da-DK" b="1" dirty="0">
+                          <a:latin typeface="Courier New" panose="02070309020205020404" pitchFamily="49" charset="0"/>
+                          <a:cs typeface="Courier New" panose="02070309020205020404" pitchFamily="49" charset="0"/>
+                        </a:rPr>
+                        <a:t>3</a:t>
+                      </a:r>
+                      <a:endParaRPr lang="en-US" b="1" dirty="0">
+                        <a:latin typeface="Courier New" panose="02070309020205020404" pitchFamily="49" charset="0"/>
+                        <a:cs typeface="Courier New" panose="02070309020205020404" pitchFamily="49" charset="0"/>
+                      </a:endParaRPr>
+                    </a:p>
+                  </a:txBody>
+                  <a:tcPr>
+                    <a:lnL w="12700" cap="flat" cmpd="sng" algn="ctr">
+                      <a:solidFill>
+                        <a:schemeClr val="tx1"/>
+                      </a:solidFill>
+                      <a:prstDash val="solid"/>
+                      <a:round/>
+                      <a:headEnd type="none" w="med" len="med"/>
+                      <a:tailEnd type="none" w="med" len="med"/>
+                    </a:lnL>
+                    <a:lnR w="12700" cap="flat" cmpd="sng" algn="ctr">
+                      <a:solidFill>
+                        <a:schemeClr val="tx1"/>
+                      </a:solidFill>
+                      <a:prstDash val="solid"/>
+                      <a:round/>
+                      <a:headEnd type="none" w="med" len="med"/>
+                      <a:tailEnd type="none" w="med" len="med"/>
+                    </a:lnR>
+                    <a:lnT w="12700" cap="flat" cmpd="sng" algn="ctr">
+                      <a:solidFill>
+                        <a:schemeClr val="tx1"/>
+                      </a:solidFill>
+                      <a:prstDash val="solid"/>
+                      <a:round/>
+                      <a:headEnd type="none" w="med" len="med"/>
+                      <a:tailEnd type="none" w="med" len="med"/>
+                    </a:lnT>
+                    <a:lnB w="12700" cap="flat" cmpd="sng" algn="ctr">
+                      <a:solidFill>
+                        <a:schemeClr val="tx1"/>
+                      </a:solidFill>
+                      <a:prstDash val="solid"/>
+                      <a:round/>
+                      <a:headEnd type="none" w="med" len="med"/>
+                      <a:tailEnd type="none" w="med" len="med"/>
+                    </a:lnB>
+                    <a:solidFill>
+                      <a:srgbClr val="FFFF00"/>
+                    </a:solidFill>
+                  </a:tcPr>
+                </a:tc>
+                <a:tc>
+                  <a:txBody>
+                    <a:bodyPr/>
+                    <a:lstStyle/>
+                    <a:p>
+                      <a:pPr algn="ctr"/>
+                      <a:r>
+                        <a:rPr lang="da-DK" b="1" dirty="0">
+                          <a:latin typeface="Courier New" panose="02070309020205020404" pitchFamily="49" charset="0"/>
+                          <a:cs typeface="Courier New" panose="02070309020205020404" pitchFamily="49" charset="0"/>
+                        </a:rPr>
+                        <a:t>4</a:t>
+                      </a:r>
+                      <a:endParaRPr lang="en-US" b="1" dirty="0">
+                        <a:latin typeface="Courier New" panose="02070309020205020404" pitchFamily="49" charset="0"/>
+                        <a:cs typeface="Courier New" panose="02070309020205020404" pitchFamily="49" charset="0"/>
+                      </a:endParaRPr>
+                    </a:p>
+                  </a:txBody>
+                  <a:tcPr>
+                    <a:lnL w="12700" cap="flat" cmpd="sng" algn="ctr">
+                      <a:solidFill>
+                        <a:schemeClr val="tx1"/>
+                      </a:solidFill>
+                      <a:prstDash val="solid"/>
+                      <a:round/>
+                      <a:headEnd type="none" w="med" len="med"/>
+                      <a:tailEnd type="none" w="med" len="med"/>
+                    </a:lnL>
+                    <a:lnR w="12700" cap="flat" cmpd="sng" algn="ctr">
+                      <a:solidFill>
+                        <a:schemeClr val="tx1"/>
+                      </a:solidFill>
+                      <a:prstDash val="solid"/>
+                      <a:round/>
+                      <a:headEnd type="none" w="med" len="med"/>
+                      <a:tailEnd type="none" w="med" len="med"/>
+                    </a:lnR>
+                    <a:lnT w="12700" cap="flat" cmpd="sng" algn="ctr">
+                      <a:solidFill>
+                        <a:schemeClr val="tx1"/>
+                      </a:solidFill>
+                      <a:prstDash val="solid"/>
+                      <a:round/>
+                      <a:headEnd type="none" w="med" len="med"/>
+                      <a:tailEnd type="none" w="med" len="med"/>
+                    </a:lnT>
+                    <a:lnB w="12700" cap="flat" cmpd="sng" algn="ctr">
+                      <a:solidFill>
+                        <a:schemeClr val="tx1"/>
+                      </a:solidFill>
+                      <a:prstDash val="solid"/>
+                      <a:round/>
+                      <a:headEnd type="none" w="med" len="med"/>
+                      <a:tailEnd type="none" w="med" len="med"/>
+                    </a:lnB>
+                    <a:solidFill>
+                      <a:srgbClr val="FFFF00"/>
+                    </a:solidFill>
+                  </a:tcPr>
+                </a:tc>
+                <a:tc>
+                  <a:txBody>
+                    <a:bodyPr/>
+                    <a:lstStyle/>
+                    <a:p>
+                      <a:pPr algn="ctr"/>
+                      <a:r>
+                        <a:rPr lang="da-DK" b="1" dirty="0">
+                          <a:latin typeface="Courier New" panose="02070309020205020404" pitchFamily="49" charset="0"/>
+                          <a:cs typeface="Courier New" panose="02070309020205020404" pitchFamily="49" charset="0"/>
+                        </a:rPr>
+                        <a:t>6</a:t>
+                      </a:r>
+                      <a:endParaRPr lang="en-US" b="1" dirty="0">
+                        <a:latin typeface="Courier New" panose="02070309020205020404" pitchFamily="49" charset="0"/>
+                        <a:cs typeface="Courier New" panose="02070309020205020404" pitchFamily="49" charset="0"/>
+                      </a:endParaRPr>
+                    </a:p>
+                  </a:txBody>
+                  <a:tcPr>
+                    <a:lnL w="12700" cap="flat" cmpd="sng" algn="ctr">
+                      <a:solidFill>
+                        <a:schemeClr val="tx1"/>
+                      </a:solidFill>
+                      <a:prstDash val="solid"/>
+                      <a:round/>
+                      <a:headEnd type="none" w="med" len="med"/>
+                      <a:tailEnd type="none" w="med" len="med"/>
+                    </a:lnL>
+                    <a:lnR w="12700" cap="flat" cmpd="sng" algn="ctr">
+                      <a:solidFill>
+                        <a:schemeClr val="tx1"/>
+                      </a:solidFill>
+                      <a:prstDash val="solid"/>
+                      <a:round/>
+                      <a:headEnd type="none" w="med" len="med"/>
+                      <a:tailEnd type="none" w="med" len="med"/>
+                    </a:lnR>
+                    <a:lnT w="12700" cap="flat" cmpd="sng" algn="ctr">
+                      <a:solidFill>
+                        <a:schemeClr val="tx1"/>
+                      </a:solidFill>
+                      <a:prstDash val="solid"/>
+                      <a:round/>
+                      <a:headEnd type="none" w="med" len="med"/>
+                      <a:tailEnd type="none" w="med" len="med"/>
+                    </a:lnT>
+                    <a:lnB w="12700" cap="flat" cmpd="sng" algn="ctr">
+                      <a:solidFill>
+                        <a:schemeClr val="tx1"/>
+                      </a:solidFill>
+                      <a:prstDash val="solid"/>
+                      <a:round/>
+                      <a:headEnd type="none" w="med" len="med"/>
+                      <a:tailEnd type="none" w="med" len="med"/>
+                    </a:lnB>
+                    <a:solidFill>
+                      <a:srgbClr val="FFFF00"/>
+                    </a:solidFill>
+                  </a:tcPr>
+                </a:tc>
+                <a:tc>
+                  <a:txBody>
+                    <a:bodyPr/>
+                    <a:lstStyle/>
+                    <a:p>
+                      <a:pPr algn="ctr"/>
+                      <a:r>
+                        <a:rPr lang="da-DK" b="1" dirty="0">
+                          <a:latin typeface="Courier New" panose="02070309020205020404" pitchFamily="49" charset="0"/>
+                          <a:cs typeface="Courier New" panose="02070309020205020404" pitchFamily="49" charset="0"/>
+                        </a:rPr>
+                        <a:t>7</a:t>
+                      </a:r>
+                      <a:endParaRPr lang="en-US" b="1" dirty="0">
+                        <a:latin typeface="Courier New" panose="02070309020205020404" pitchFamily="49" charset="0"/>
+                        <a:cs typeface="Courier New" panose="02070309020205020404" pitchFamily="49" charset="0"/>
+                      </a:endParaRPr>
+                    </a:p>
+                  </a:txBody>
+                  <a:tcPr>
+                    <a:lnL w="12700" cap="flat" cmpd="sng" algn="ctr">
+                      <a:solidFill>
+                        <a:schemeClr val="tx1"/>
+                      </a:solidFill>
+                      <a:prstDash val="solid"/>
+                      <a:round/>
+                      <a:headEnd type="none" w="med" len="med"/>
+                      <a:tailEnd type="none" w="med" len="med"/>
+                    </a:lnL>
+                    <a:lnR w="12700" cap="flat" cmpd="sng" algn="ctr">
+                      <a:solidFill>
+                        <a:schemeClr val="tx1"/>
+                      </a:solidFill>
+                      <a:prstDash val="solid"/>
+                      <a:round/>
+                      <a:headEnd type="none" w="med" len="med"/>
+                      <a:tailEnd type="none" w="med" len="med"/>
+                    </a:lnR>
+                    <a:lnT w="12700" cap="flat" cmpd="sng" algn="ctr">
+                      <a:solidFill>
+                        <a:schemeClr val="tx1"/>
+                      </a:solidFill>
+                      <a:prstDash val="solid"/>
+                      <a:round/>
+                      <a:headEnd type="none" w="med" len="med"/>
+                      <a:tailEnd type="none" w="med" len="med"/>
+                    </a:lnT>
+                    <a:lnB w="12700" cap="flat" cmpd="sng" algn="ctr">
+                      <a:solidFill>
+                        <a:schemeClr val="tx1"/>
+                      </a:solidFill>
+                      <a:prstDash val="solid"/>
+                      <a:round/>
+                      <a:headEnd type="none" w="med" len="med"/>
+                      <a:tailEnd type="none" w="med" len="med"/>
+                    </a:lnB>
+                    <a:solidFill>
+                      <a:srgbClr val="FFFF00"/>
+                    </a:solidFill>
+                  </a:tcPr>
+                </a:tc>
+                <a:tc>
+                  <a:txBody>
+                    <a:bodyPr/>
+                    <a:lstStyle/>
+                    <a:p>
+                      <a:pPr algn="ctr"/>
+                      <a:r>
+                        <a:rPr lang="da-DK" b="1" dirty="0">
+                          <a:latin typeface="Courier New" panose="02070309020205020404" pitchFamily="49" charset="0"/>
+                          <a:cs typeface="Courier New" panose="02070309020205020404" pitchFamily="49" charset="0"/>
+                        </a:rPr>
+                        <a:t>7</a:t>
+                      </a:r>
+                      <a:endParaRPr lang="en-US" b="1" dirty="0">
+                        <a:latin typeface="Courier New" panose="02070309020205020404" pitchFamily="49" charset="0"/>
+                        <a:cs typeface="Courier New" panose="02070309020205020404" pitchFamily="49" charset="0"/>
+                      </a:endParaRPr>
+                    </a:p>
+                  </a:txBody>
+                  <a:tcPr>
+                    <a:lnL w="12700" cap="flat" cmpd="sng" algn="ctr">
+                      <a:solidFill>
+                        <a:schemeClr val="tx1"/>
+                      </a:solidFill>
+                      <a:prstDash val="solid"/>
+                      <a:round/>
+                      <a:headEnd type="none" w="med" len="med"/>
+                      <a:tailEnd type="none" w="med" len="med"/>
+                    </a:lnL>
+                    <a:lnR w="12700" cap="flat" cmpd="sng" algn="ctr">
+                      <a:solidFill>
+                        <a:schemeClr val="tx1"/>
+                      </a:solidFill>
+                      <a:prstDash val="solid"/>
+                      <a:round/>
+                      <a:headEnd type="none" w="med" len="med"/>
+                      <a:tailEnd type="none" w="med" len="med"/>
+                    </a:lnR>
+                    <a:lnT w="12700" cap="flat" cmpd="sng" algn="ctr">
+                      <a:solidFill>
+                        <a:schemeClr val="tx1"/>
+                      </a:solidFill>
+                      <a:prstDash val="solid"/>
+                      <a:round/>
+                      <a:headEnd type="none" w="med" len="med"/>
+                      <a:tailEnd type="none" w="med" len="med"/>
+                    </a:lnT>
+                    <a:lnB w="12700" cap="flat" cmpd="sng" algn="ctr">
+                      <a:solidFill>
+                        <a:schemeClr val="tx1"/>
+                      </a:solidFill>
+                      <a:prstDash val="solid"/>
+                      <a:round/>
+                      <a:headEnd type="none" w="med" len="med"/>
+                      <a:tailEnd type="none" w="med" len="med"/>
+                    </a:lnB>
+                    <a:solidFill>
+                      <a:srgbClr val="FFFF00"/>
+                    </a:solidFill>
+                  </a:tcPr>
+                </a:tc>
+                <a:tc>
+                  <a:txBody>
+                    <a:bodyPr/>
+                    <a:lstStyle/>
+                    <a:p>
+                      <a:pPr algn="ctr"/>
+                      <a:r>
+                        <a:rPr lang="da-DK" b="1" dirty="0">
+                          <a:latin typeface="Courier New" panose="02070309020205020404" pitchFamily="49" charset="0"/>
+                          <a:cs typeface="Courier New" panose="02070309020205020404" pitchFamily="49" charset="0"/>
+                        </a:rPr>
+                        <a:t>7</a:t>
+                      </a:r>
+                      <a:endParaRPr lang="en-US" b="1" dirty="0">
+                        <a:latin typeface="Courier New" panose="02070309020205020404" pitchFamily="49" charset="0"/>
+                        <a:cs typeface="Courier New" panose="02070309020205020404" pitchFamily="49" charset="0"/>
+                      </a:endParaRPr>
+                    </a:p>
+                  </a:txBody>
+                  <a:tcPr>
+                    <a:lnL w="12700" cap="flat" cmpd="sng" algn="ctr">
+                      <a:solidFill>
+                        <a:schemeClr val="tx1"/>
+                      </a:solidFill>
+                      <a:prstDash val="solid"/>
+                      <a:round/>
+                      <a:headEnd type="none" w="med" len="med"/>
+                      <a:tailEnd type="none" w="med" len="med"/>
+                    </a:lnL>
+                    <a:lnR w="12700" cap="flat" cmpd="sng" algn="ctr">
+                      <a:solidFill>
+                        <a:schemeClr val="tx1"/>
+                      </a:solidFill>
+                      <a:prstDash val="solid"/>
+                      <a:round/>
+                      <a:headEnd type="none" w="med" len="med"/>
+                      <a:tailEnd type="none" w="med" len="med"/>
+                    </a:lnR>
+                    <a:lnT w="12700" cap="flat" cmpd="sng" algn="ctr">
+                      <a:solidFill>
+                        <a:schemeClr val="tx1"/>
+                      </a:solidFill>
+                      <a:prstDash val="solid"/>
+                      <a:round/>
+                      <a:headEnd type="none" w="med" len="med"/>
+                      <a:tailEnd type="none" w="med" len="med"/>
+                    </a:lnT>
+                    <a:lnB w="12700" cap="flat" cmpd="sng" algn="ctr">
+                      <a:solidFill>
+                        <a:schemeClr val="tx1"/>
+                      </a:solidFill>
+                      <a:prstDash val="solid"/>
+                      <a:round/>
+                      <a:headEnd type="none" w="med" len="med"/>
+                      <a:tailEnd type="none" w="med" len="med"/>
+                    </a:lnB>
+                    <a:solidFill>
+                      <a:srgbClr val="FFFF00"/>
+                    </a:solidFill>
+                  </a:tcPr>
+                </a:tc>
+                <a:tc>
+                  <a:txBody>
+                    <a:bodyPr/>
+                    <a:lstStyle/>
+                    <a:p>
+                      <a:pPr algn="ctr"/>
+                      <a:r>
+                        <a:rPr lang="da-DK" b="1" dirty="0">
+                          <a:latin typeface="Courier New" panose="02070309020205020404" pitchFamily="49" charset="0"/>
+                          <a:cs typeface="Courier New" panose="02070309020205020404" pitchFamily="49" charset="0"/>
+                        </a:rPr>
+                        <a:t>10</a:t>
+                      </a:r>
+                      <a:endParaRPr lang="en-US" b="1" dirty="0">
+                        <a:latin typeface="Courier New" panose="02070309020205020404" pitchFamily="49" charset="0"/>
+                        <a:cs typeface="Courier New" panose="02070309020205020404" pitchFamily="49" charset="0"/>
+                      </a:endParaRPr>
+                    </a:p>
+                  </a:txBody>
+                  <a:tcPr>
+                    <a:lnL w="12700" cap="flat" cmpd="sng" algn="ctr">
+                      <a:solidFill>
+                        <a:schemeClr val="tx1"/>
+                      </a:solidFill>
+                      <a:prstDash val="solid"/>
+                      <a:round/>
+                      <a:headEnd type="none" w="med" len="med"/>
+                      <a:tailEnd type="none" w="med" len="med"/>
+                    </a:lnL>
+                    <a:lnR w="12700" cap="flat" cmpd="sng" algn="ctr">
+                      <a:solidFill>
+                        <a:schemeClr val="tx1"/>
+                      </a:solidFill>
+                      <a:prstDash val="solid"/>
+                      <a:round/>
+                      <a:headEnd type="none" w="med" len="med"/>
+                      <a:tailEnd type="none" w="med" len="med"/>
+                    </a:lnR>
+                    <a:lnT w="12700" cap="flat" cmpd="sng" algn="ctr">
+                      <a:solidFill>
+                        <a:schemeClr val="tx1"/>
+                      </a:solidFill>
+                      <a:prstDash val="solid"/>
+                      <a:round/>
+                      <a:headEnd type="none" w="med" len="med"/>
+                      <a:tailEnd type="none" w="med" len="med"/>
+                    </a:lnT>
+                    <a:lnB w="12700" cap="flat" cmpd="sng" algn="ctr">
+                      <a:solidFill>
+                        <a:schemeClr val="tx1"/>
+                      </a:solidFill>
+                      <a:prstDash val="solid"/>
+                      <a:round/>
+                      <a:headEnd type="none" w="med" len="med"/>
+                      <a:tailEnd type="none" w="med" len="med"/>
+                    </a:lnB>
+                    <a:solidFill>
+                      <a:srgbClr val="FFFF00"/>
+                    </a:solidFill>
+                  </a:tcPr>
+                </a:tc>
+                <a:tc>
+                  <a:txBody>
+                    <a:bodyPr/>
+                    <a:lstStyle/>
+                    <a:p>
+                      <a:pPr algn="ctr"/>
+                      <a:r>
+                        <a:rPr lang="da-DK" b="1" dirty="0">
+                          <a:latin typeface="Courier New" panose="02070309020205020404" pitchFamily="49" charset="0"/>
+                          <a:cs typeface="Courier New" panose="02070309020205020404" pitchFamily="49" charset="0"/>
+                        </a:rPr>
+                        <a:t>11</a:t>
+                      </a:r>
+                      <a:endParaRPr lang="en-US" b="1" dirty="0">
+                        <a:latin typeface="Courier New" panose="02070309020205020404" pitchFamily="49" charset="0"/>
+                        <a:cs typeface="Courier New" panose="02070309020205020404" pitchFamily="49" charset="0"/>
+                      </a:endParaRPr>
+                    </a:p>
+                  </a:txBody>
+                  <a:tcPr>
+                    <a:lnL w="12700" cap="flat" cmpd="sng" algn="ctr">
+                      <a:solidFill>
+                        <a:schemeClr val="tx1"/>
+                      </a:solidFill>
+                      <a:prstDash val="solid"/>
+                      <a:round/>
+                      <a:headEnd type="none" w="med" len="med"/>
+                      <a:tailEnd type="none" w="med" len="med"/>
+                    </a:lnL>
+                    <a:lnR w="12700" cap="flat" cmpd="sng" algn="ctr">
+                      <a:solidFill>
+                        <a:schemeClr val="tx1"/>
+                      </a:solidFill>
+                      <a:prstDash val="solid"/>
+                      <a:round/>
+                      <a:headEnd type="none" w="med" len="med"/>
+                      <a:tailEnd type="none" w="med" len="med"/>
+                    </a:lnR>
+                    <a:lnT w="12700" cap="flat" cmpd="sng" algn="ctr">
+                      <a:solidFill>
+                        <a:schemeClr val="tx1"/>
+                      </a:solidFill>
+                      <a:prstDash val="solid"/>
+                      <a:round/>
+                      <a:headEnd type="none" w="med" len="med"/>
+                      <a:tailEnd type="none" w="med" len="med"/>
+                    </a:lnT>
+                    <a:lnB w="12700" cap="flat" cmpd="sng" algn="ctr">
+                      <a:solidFill>
+                        <a:schemeClr val="tx1"/>
+                      </a:solidFill>
+                      <a:prstDash val="solid"/>
+                      <a:round/>
+                      <a:headEnd type="none" w="med" len="med"/>
+                      <a:tailEnd type="none" w="med" len="med"/>
+                    </a:lnB>
+                    <a:solidFill>
+                      <a:srgbClr val="FFFF00"/>
+                    </a:solidFill>
+                  </a:tcPr>
+                </a:tc>
+                <a:tc>
+                  <a:txBody>
+                    <a:bodyPr/>
+                    <a:lstStyle/>
+                    <a:p>
+                      <a:pPr algn="ctr"/>
+                      <a:r>
+                        <a:rPr lang="da-DK" b="1" dirty="0">
+                          <a:latin typeface="Courier New" panose="02070309020205020404" pitchFamily="49" charset="0"/>
+                          <a:cs typeface="Courier New" panose="02070309020205020404" pitchFamily="49" charset="0"/>
+                        </a:rPr>
+                        <a:t>13</a:t>
+                      </a:r>
+                      <a:endParaRPr lang="en-US" b="1" dirty="0">
+                        <a:latin typeface="Courier New" panose="02070309020205020404" pitchFamily="49" charset="0"/>
+                        <a:cs typeface="Courier New" panose="02070309020205020404" pitchFamily="49" charset="0"/>
+                      </a:endParaRPr>
+                    </a:p>
+                  </a:txBody>
+                  <a:tcPr>
+                    <a:lnL w="12700" cap="flat" cmpd="sng" algn="ctr">
+                      <a:solidFill>
+                        <a:schemeClr val="tx1"/>
+                      </a:solidFill>
+                      <a:prstDash val="solid"/>
+                      <a:round/>
+                      <a:headEnd type="none" w="med" len="med"/>
+                      <a:tailEnd type="none" w="med" len="med"/>
+                    </a:lnL>
+                    <a:lnR w="12700" cap="flat" cmpd="sng" algn="ctr">
+                      <a:solidFill>
+                        <a:schemeClr val="tx1"/>
+                      </a:solidFill>
+                      <a:prstDash val="solid"/>
+                      <a:round/>
+                      <a:headEnd type="none" w="med" len="med"/>
+                      <a:tailEnd type="none" w="med" len="med"/>
+                    </a:lnR>
+                    <a:lnT w="12700" cap="flat" cmpd="sng" algn="ctr">
+                      <a:solidFill>
+                        <a:schemeClr val="tx1"/>
+                      </a:solidFill>
+                      <a:prstDash val="solid"/>
+                      <a:round/>
+                      <a:headEnd type="none" w="med" len="med"/>
+                      <a:tailEnd type="none" w="med" len="med"/>
+                    </a:lnT>
+                    <a:lnB w="12700" cap="flat" cmpd="sng" algn="ctr">
+                      <a:solidFill>
+                        <a:schemeClr val="tx1"/>
+                      </a:solidFill>
+                      <a:prstDash val="solid"/>
+                      <a:round/>
+                      <a:headEnd type="none" w="med" len="med"/>
+                      <a:tailEnd type="none" w="med" len="med"/>
+                    </a:lnB>
+                    <a:solidFill>
+                      <a:srgbClr val="FFFF00"/>
+                    </a:solidFill>
+                  </a:tcPr>
+                </a:tc>
+                <a:tc>
+                  <a:txBody>
+                    <a:bodyPr/>
+                    <a:lstStyle/>
+                    <a:p>
+                      <a:pPr algn="ctr"/>
+                      <a:r>
+                        <a:rPr lang="da-DK" b="1" dirty="0">
+                          <a:latin typeface="Courier New" panose="02070309020205020404" pitchFamily="49" charset="0"/>
+                          <a:cs typeface="Courier New" panose="02070309020205020404" pitchFamily="49" charset="0"/>
+                        </a:rPr>
+                        <a:t>16</a:t>
+                      </a:r>
+                      <a:endParaRPr lang="en-US" b="1" dirty="0">
+                        <a:latin typeface="Courier New" panose="02070309020205020404" pitchFamily="49" charset="0"/>
+                        <a:cs typeface="Courier New" panose="02070309020205020404" pitchFamily="49" charset="0"/>
+                      </a:endParaRPr>
+                    </a:p>
+                  </a:txBody>
+                  <a:tcPr>
+                    <a:lnL w="12700" cap="flat" cmpd="sng" algn="ctr">
+                      <a:solidFill>
+                        <a:schemeClr val="tx1"/>
+                      </a:solidFill>
+                      <a:prstDash val="solid"/>
+                      <a:round/>
+                      <a:headEnd type="none" w="med" len="med"/>
+                      <a:tailEnd type="none" w="med" len="med"/>
+                    </a:lnL>
+                    <a:lnR w="12700" cap="flat" cmpd="sng" algn="ctr">
+                      <a:solidFill>
+                        <a:schemeClr val="tx1"/>
+                      </a:solidFill>
+                      <a:prstDash val="solid"/>
+                      <a:round/>
+                      <a:headEnd type="none" w="med" len="med"/>
+                      <a:tailEnd type="none" w="med" len="med"/>
+                    </a:lnR>
+                    <a:lnT w="12700" cap="flat" cmpd="sng" algn="ctr">
+                      <a:solidFill>
+                        <a:schemeClr val="tx1"/>
+                      </a:solidFill>
+                      <a:prstDash val="solid"/>
+                      <a:round/>
+                      <a:headEnd type="none" w="med" len="med"/>
+                      <a:tailEnd type="none" w="med" len="med"/>
+                    </a:lnT>
+                    <a:lnB w="12700" cap="flat" cmpd="sng" algn="ctr">
+                      <a:solidFill>
+                        <a:schemeClr val="tx1"/>
+                      </a:solidFill>
+                      <a:prstDash val="solid"/>
+                      <a:round/>
+                      <a:headEnd type="none" w="med" len="med"/>
+                      <a:tailEnd type="none" w="med" len="med"/>
+                    </a:lnB>
+                    <a:solidFill>
+                      <a:srgbClr val="FFFF00"/>
+                    </a:solidFill>
+                  </a:tcPr>
+                </a:tc>
+                <a:tc>
+                  <a:txBody>
+                    <a:bodyPr/>
+                    <a:lstStyle/>
+                    <a:p>
+                      <a:pPr algn="ctr"/>
+                      <a:r>
+                        <a:rPr lang="da-DK" b="1" dirty="0">
+                          <a:latin typeface="Courier New" panose="02070309020205020404" pitchFamily="49" charset="0"/>
+                          <a:cs typeface="Courier New" panose="02070309020205020404" pitchFamily="49" charset="0"/>
+                        </a:rPr>
+                        <a:t>17</a:t>
+                      </a:r>
+                      <a:endParaRPr lang="en-US" b="1" dirty="0">
+                        <a:latin typeface="Courier New" panose="02070309020205020404" pitchFamily="49" charset="0"/>
+                        <a:cs typeface="Courier New" panose="02070309020205020404" pitchFamily="49" charset="0"/>
+                      </a:endParaRPr>
+                    </a:p>
+                  </a:txBody>
+                  <a:tcPr>
+                    <a:lnL w="12700" cap="flat" cmpd="sng" algn="ctr">
+                      <a:solidFill>
+                        <a:schemeClr val="tx1"/>
+                      </a:solidFill>
+                      <a:prstDash val="solid"/>
+                      <a:round/>
+                      <a:headEnd type="none" w="med" len="med"/>
+                      <a:tailEnd type="none" w="med" len="med"/>
+                    </a:lnL>
+                    <a:lnR w="12700" cap="flat" cmpd="sng" algn="ctr">
+                      <a:solidFill>
+                        <a:schemeClr val="tx1"/>
+                      </a:solidFill>
+                      <a:prstDash val="solid"/>
+                      <a:round/>
+                      <a:headEnd type="none" w="med" len="med"/>
+                      <a:tailEnd type="none" w="med" len="med"/>
+                    </a:lnR>
+                    <a:lnT w="12700" cap="flat" cmpd="sng" algn="ctr">
+                      <a:solidFill>
+                        <a:schemeClr val="tx1"/>
+                      </a:solidFill>
+                      <a:prstDash val="solid"/>
+                      <a:round/>
+                      <a:headEnd type="none" w="med" len="med"/>
+                      <a:tailEnd type="none" w="med" len="med"/>
+                    </a:lnT>
+                    <a:lnB w="12700" cap="flat" cmpd="sng" algn="ctr">
+                      <a:solidFill>
+                        <a:schemeClr val="tx1"/>
+                      </a:solidFill>
+                      <a:prstDash val="solid"/>
+                      <a:round/>
+                      <a:headEnd type="none" w="med" len="med"/>
+                      <a:tailEnd type="none" w="med" len="med"/>
+                    </a:lnB>
+                    <a:solidFill>
+                      <a:srgbClr val="FFFF00"/>
+                    </a:solidFill>
+                  </a:tcPr>
+                </a:tc>
+                <a:extLst>
+                  <a:ext uri="{0D108BD9-81ED-4DB2-BD59-A6C34878D82A}">
+                    <a16:rowId xmlns:a16="http://schemas.microsoft.com/office/drawing/2014/main" val="1457267651"/>
+                  </a:ext>
+                </a:extLst>
+              </a:tr>
+            </a:tbl>
+          </a:graphicData>
+        </a:graphic>
+      </p:graphicFrame>
+      <p:cxnSp>
+        <p:nvCxnSpPr>
+          <p:cNvPr id="13" name="Straight Arrow Connector 12">
+            <a:extLst>
+              <a:ext uri="{FF2B5EF4-FFF2-40B4-BE49-F238E27FC236}">
+                <a16:creationId xmlns:a16="http://schemas.microsoft.com/office/drawing/2014/main" id="{97508C72-EE9D-4F7B-EE7A-E2EE4DA95A02}"/>
+              </a:ext>
+            </a:extLst>
+          </p:cNvPr>
+          <p:cNvCxnSpPr>
+            <a:cxnSpLocks/>
+          </p:cNvCxnSpPr>
+          <p:nvPr/>
+        </p:nvCxnSpPr>
+        <p:spPr>
+          <a:xfrm>
+            <a:off x="3735281" y="5465379"/>
+            <a:ext cx="0" cy="289003"/>
+          </a:xfrm>
+          <a:prstGeom prst="straightConnector1">
+            <a:avLst/>
+          </a:prstGeom>
+          <a:ln>
+            <a:solidFill>
+              <a:schemeClr val="tx1"/>
+            </a:solidFill>
+            <a:tailEnd type="triangle"/>
+          </a:ln>
+        </p:spPr>
+        <p:style>
+          <a:lnRef idx="1">
+            <a:schemeClr val="accent1"/>
+          </a:lnRef>
+          <a:fillRef idx="0">
+            <a:schemeClr val="accent1"/>
+          </a:fillRef>
+          <a:effectRef idx="0">
+            <a:schemeClr val="accent1"/>
+          </a:effectRef>
+          <a:fontRef idx="minor">
+            <a:schemeClr val="tx1"/>
+          </a:fontRef>
+        </p:style>
+      </p:cxnSp>
+      <p:sp>
+        <p:nvSpPr>
+          <p:cNvPr id="16" name="TextBox 15">
+            <a:extLst>
+              <a:ext uri="{FF2B5EF4-FFF2-40B4-BE49-F238E27FC236}">
+                <a16:creationId xmlns:a16="http://schemas.microsoft.com/office/drawing/2014/main" id="{B8A4B65A-06D7-11D9-1B7D-08BC26E2352F}"/>
+              </a:ext>
+            </a:extLst>
+          </p:cNvPr>
+          <p:cNvSpPr txBox="1"/>
+          <p:nvPr/>
+        </p:nvSpPr>
+        <p:spPr>
+          <a:xfrm>
+            <a:off x="1950720" y="5149467"/>
+            <a:ext cx="2301445" cy="307777"/>
+          </a:xfrm>
+          <a:prstGeom prst="rect">
+            <a:avLst/>
+          </a:prstGeom>
+          <a:noFill/>
+        </p:spPr>
+        <p:txBody>
+          <a:bodyPr wrap="square">
+            <a:spAutoFit/>
+          </a:bodyPr>
+          <a:lstStyle/>
+          <a:p>
+            <a:pPr algn="r"/>
+            <a:r>
+              <a:rPr lang="en-US" sz="1400" b="1" dirty="0" err="1">
+                <a:solidFill>
+                  <a:schemeClr val="tx1"/>
+                </a:solidFill>
+                <a:latin typeface="Courier New" panose="02070309020205020404" pitchFamily="49" charset="0"/>
+                <a:cs typeface="Courier New" panose="02070309020205020404" pitchFamily="49" charset="0"/>
+              </a:rPr>
+              <a:t>bisect_left</a:t>
+            </a:r>
+            <a:r>
+              <a:rPr lang="en-US" sz="1400" b="1" dirty="0">
+                <a:solidFill>
+                  <a:schemeClr val="tx1"/>
+                </a:solidFill>
+                <a:latin typeface="Courier New" panose="02070309020205020404" pitchFamily="49" charset="0"/>
+                <a:cs typeface="Courier New" panose="02070309020205020404" pitchFamily="49" charset="0"/>
+              </a:rPr>
+              <a:t>(L, 7)</a:t>
+            </a:r>
+            <a:endParaRPr lang="en-US" sz="1400" dirty="0"/>
+          </a:p>
+        </p:txBody>
+      </p:sp>
+      <p:cxnSp>
+        <p:nvCxnSpPr>
+          <p:cNvPr id="17" name="Straight Arrow Connector 16">
+            <a:extLst>
+              <a:ext uri="{FF2B5EF4-FFF2-40B4-BE49-F238E27FC236}">
+                <a16:creationId xmlns:a16="http://schemas.microsoft.com/office/drawing/2014/main" id="{87A7AE90-EA3B-A87C-0BB3-AEE4A06077F9}"/>
+              </a:ext>
+            </a:extLst>
+          </p:cNvPr>
+          <p:cNvCxnSpPr>
+            <a:cxnSpLocks/>
+          </p:cNvCxnSpPr>
+          <p:nvPr/>
+        </p:nvCxnSpPr>
+        <p:spPr>
+          <a:xfrm>
+            <a:off x="5663605" y="5485197"/>
+            <a:ext cx="0" cy="289003"/>
+          </a:xfrm>
+          <a:prstGeom prst="straightConnector1">
+            <a:avLst/>
+          </a:prstGeom>
+          <a:ln>
+            <a:solidFill>
+              <a:schemeClr val="tx1"/>
+            </a:solidFill>
+            <a:tailEnd type="triangle"/>
+          </a:ln>
+        </p:spPr>
+        <p:style>
+          <a:lnRef idx="1">
+            <a:schemeClr val="accent1"/>
+          </a:lnRef>
+          <a:fillRef idx="0">
+            <a:schemeClr val="accent1"/>
+          </a:fillRef>
+          <a:effectRef idx="0">
+            <a:schemeClr val="accent1"/>
+          </a:effectRef>
+          <a:fontRef idx="minor">
+            <a:schemeClr val="tx1"/>
+          </a:fontRef>
+        </p:style>
+      </p:cxnSp>
+      <p:sp>
+        <p:nvSpPr>
+          <p:cNvPr id="18" name="TextBox 17">
+            <a:extLst>
+              <a:ext uri="{FF2B5EF4-FFF2-40B4-BE49-F238E27FC236}">
+                <a16:creationId xmlns:a16="http://schemas.microsoft.com/office/drawing/2014/main" id="{7C55346A-44F9-5112-9FB0-154AD01DE983}"/>
+              </a:ext>
+            </a:extLst>
+          </p:cNvPr>
+          <p:cNvSpPr txBox="1"/>
+          <p:nvPr/>
+        </p:nvSpPr>
+        <p:spPr>
+          <a:xfrm>
+            <a:off x="4556496" y="5149467"/>
+            <a:ext cx="3047998" cy="307777"/>
+          </a:xfrm>
+          <a:prstGeom prst="rect">
+            <a:avLst/>
+          </a:prstGeom>
+          <a:noFill/>
+        </p:spPr>
+        <p:txBody>
+          <a:bodyPr wrap="square">
+            <a:spAutoFit/>
+          </a:bodyPr>
+          <a:lstStyle/>
+          <a:p>
+            <a:r>
+              <a:rPr lang="en-US" sz="1400" b="1" dirty="0" err="1">
+                <a:solidFill>
+                  <a:schemeClr val="tx1"/>
+                </a:solidFill>
+                <a:latin typeface="Courier New" panose="02070309020205020404" pitchFamily="49" charset="0"/>
+                <a:cs typeface="Courier New" panose="02070309020205020404" pitchFamily="49" charset="0"/>
+              </a:rPr>
+              <a:t>bisect_</a:t>
+            </a:r>
+            <a:r>
+              <a:rPr lang="en-US" sz="1400" b="1" dirty="0" err="1">
+                <a:latin typeface="Courier New" panose="02070309020205020404" pitchFamily="49" charset="0"/>
+                <a:cs typeface="Courier New" panose="02070309020205020404" pitchFamily="49" charset="0"/>
+              </a:rPr>
+              <a:t>right</a:t>
+            </a:r>
+            <a:r>
+              <a:rPr lang="en-US" sz="1400" b="1" dirty="0">
+                <a:solidFill>
+                  <a:schemeClr val="tx1"/>
+                </a:solidFill>
+                <a:latin typeface="Courier New" panose="02070309020205020404" pitchFamily="49" charset="0"/>
+                <a:cs typeface="Courier New" panose="02070309020205020404" pitchFamily="49" charset="0"/>
+              </a:rPr>
+              <a:t>(L, 7)</a:t>
+            </a:r>
+            <a:endParaRPr lang="en-US" sz="1400" dirty="0"/>
+          </a:p>
+        </p:txBody>
+      </p:sp>
+      <p:sp>
+        <p:nvSpPr>
+          <p:cNvPr id="20" name="TextBox 19">
+            <a:extLst>
+              <a:ext uri="{FF2B5EF4-FFF2-40B4-BE49-F238E27FC236}">
+                <a16:creationId xmlns:a16="http://schemas.microsoft.com/office/drawing/2014/main" id="{E9240245-F323-65AC-AC86-6ABC0D8422D1}"/>
+              </a:ext>
+            </a:extLst>
+          </p:cNvPr>
+          <p:cNvSpPr txBox="1"/>
+          <p:nvPr/>
+        </p:nvSpPr>
+        <p:spPr>
+          <a:xfrm>
+            <a:off x="6982179" y="5149467"/>
+            <a:ext cx="4761495" cy="307777"/>
+          </a:xfrm>
+          <a:prstGeom prst="rect">
+            <a:avLst/>
+          </a:prstGeom>
+          <a:noFill/>
+        </p:spPr>
+        <p:txBody>
+          <a:bodyPr wrap="square">
+            <a:spAutoFit/>
+          </a:bodyPr>
+          <a:lstStyle/>
+          <a:p>
+            <a:r>
+              <a:rPr lang="en-US" sz="1400" b="1" dirty="0" err="1">
+                <a:solidFill>
+                  <a:schemeClr val="tx1"/>
+                </a:solidFill>
+                <a:latin typeface="Courier New" panose="02070309020205020404" pitchFamily="49" charset="0"/>
+                <a:cs typeface="Courier New" panose="02070309020205020404" pitchFamily="49" charset="0"/>
+              </a:rPr>
+              <a:t>bisect_left</a:t>
+            </a:r>
+            <a:r>
+              <a:rPr lang="en-US" sz="1400" b="1" dirty="0">
+                <a:solidFill>
+                  <a:schemeClr val="tx1"/>
+                </a:solidFill>
+                <a:latin typeface="Courier New" panose="02070309020205020404" pitchFamily="49" charset="0"/>
+                <a:cs typeface="Courier New" panose="02070309020205020404" pitchFamily="49" charset="0"/>
+              </a:rPr>
+              <a:t>(L, 14) = </a:t>
+            </a:r>
+            <a:r>
+              <a:rPr lang="en-US" sz="1400" b="1" dirty="0" err="1">
+                <a:solidFill>
+                  <a:schemeClr val="tx1"/>
+                </a:solidFill>
+                <a:latin typeface="Courier New" panose="02070309020205020404" pitchFamily="49" charset="0"/>
+                <a:cs typeface="Courier New" panose="02070309020205020404" pitchFamily="49" charset="0"/>
+              </a:rPr>
+              <a:t>bisect_</a:t>
+            </a:r>
+            <a:r>
+              <a:rPr lang="en-US" sz="1400" b="1" dirty="0" err="1">
+                <a:latin typeface="Courier New" panose="02070309020205020404" pitchFamily="49" charset="0"/>
+                <a:cs typeface="Courier New" panose="02070309020205020404" pitchFamily="49" charset="0"/>
+              </a:rPr>
+              <a:t>right</a:t>
+            </a:r>
+            <a:r>
+              <a:rPr lang="en-US" sz="1400" b="1" dirty="0">
+                <a:solidFill>
+                  <a:schemeClr val="tx1"/>
+                </a:solidFill>
+                <a:latin typeface="Courier New" panose="02070309020205020404" pitchFamily="49" charset="0"/>
+                <a:cs typeface="Courier New" panose="02070309020205020404" pitchFamily="49" charset="0"/>
+              </a:rPr>
+              <a:t>(L, 14)</a:t>
+            </a:r>
+            <a:endParaRPr lang="en-US" sz="1400" dirty="0"/>
+          </a:p>
+        </p:txBody>
+      </p:sp>
+      <p:cxnSp>
+        <p:nvCxnSpPr>
+          <p:cNvPr id="27" name="Straight Arrow Connector 26">
+            <a:extLst>
+              <a:ext uri="{FF2B5EF4-FFF2-40B4-BE49-F238E27FC236}">
+                <a16:creationId xmlns:a16="http://schemas.microsoft.com/office/drawing/2014/main" id="{CB8FBD1D-9C9D-9B7F-346A-48CEDA043D18}"/>
+              </a:ext>
+            </a:extLst>
+          </p:cNvPr>
+          <p:cNvCxnSpPr>
+            <a:cxnSpLocks/>
+          </p:cNvCxnSpPr>
+          <p:nvPr/>
+        </p:nvCxnSpPr>
+        <p:spPr>
+          <a:xfrm>
+            <a:off x="7609595" y="5485196"/>
+            <a:ext cx="0" cy="289003"/>
+          </a:xfrm>
+          <a:prstGeom prst="straightConnector1">
+            <a:avLst/>
+          </a:prstGeom>
+          <a:ln>
+            <a:solidFill>
+              <a:schemeClr val="tx1"/>
+            </a:solidFill>
+            <a:tailEnd type="triangle"/>
+          </a:ln>
+        </p:spPr>
+        <p:style>
+          <a:lnRef idx="1">
+            <a:schemeClr val="accent1"/>
+          </a:lnRef>
+          <a:fillRef idx="0">
+            <a:schemeClr val="accent1"/>
+          </a:fillRef>
+          <a:effectRef idx="0">
+            <a:schemeClr val="accent1"/>
+          </a:effectRef>
+          <a:fontRef idx="minor">
+            <a:schemeClr val="tx1"/>
+          </a:fontRef>
+        </p:style>
+      </p:cxnSp>
+    </p:spTree>
+    <p:extLst>
+      <p:ext uri="{BB962C8B-B14F-4D97-AF65-F5344CB8AC3E}">
+        <p14:creationId xmlns:p14="http://schemas.microsoft.com/office/powerpoint/2010/main" val="2077438254"/>
+      </p:ext>
+    </p:extLst>
+  </p:cSld>
+  <p:clrMapOvr>
+    <a:masterClrMapping/>
+  </p:clrMapOvr>
+</p:sld>
+</file>
+
+<file path=ppt/slides/slide16.xml><?xml version="1.0" encoding="utf-8"?>
+<p:sld xmlns:a="http://schemas.openxmlformats.org/drawingml/2006/main" xmlns:r="http://schemas.openxmlformats.org/officeDocument/2006/relationships" xmlns:p="http://schemas.openxmlformats.org/presentationml/2006/main">
+  <p:cSld>
+    <p:spTree>
+      <p:nvGrpSpPr>
+        <p:cNvPr id="1" name=""/>
+        <p:cNvGrpSpPr/>
+        <p:nvPr/>
+      </p:nvGrpSpPr>
+      <p:grpSpPr>
+        <a:xfrm>
+          <a:off x="0" y="0"/>
+          <a:ext cx="0" cy="0"/>
+          <a:chOff x="0" y="0"/>
+          <a:chExt cx="0" cy="0"/>
+        </a:xfrm>
+      </p:grpSpPr>
+      <p:sp>
+        <p:nvSpPr>
           <p:cNvPr id="2" name="Title 1"/>
           <p:cNvSpPr>
             <a:spLocks noGrp="1"/>

</xml_diff>